<commit_message>
update presentation for self management
</commit_message>
<xml_diff>
--- a/softskills/self management/self_management.pptx
+++ b/softskills/self management/self_management.pptx
@@ -6,6 +6,14 @@
   </p:sldMasterIdLst>
   <p:sldIdLst>
     <p:sldId id="256" r:id="rId2"/>
+    <p:sldId id="258" r:id="rId3"/>
+    <p:sldId id="259" r:id="rId4"/>
+    <p:sldId id="260" r:id="rId5"/>
+    <p:sldId id="257" r:id="rId6"/>
+    <p:sldId id="261" r:id="rId7"/>
+    <p:sldId id="262" r:id="rId8"/>
+    <p:sldId id="263" r:id="rId9"/>
+    <p:sldId id="264" r:id="rId10"/>
   </p:sldIdLst>
   <p:sldSz cx="12192000" cy="6858000"/>
   <p:notesSz cx="6858000" cy="9144000"/>
@@ -104,6 +112,11 @@
       </a:defRPr>
     </a:lvl9pPr>
   </p:defaultTextStyle>
+  <p:extLst>
+    <p:ext uri="{EFAFB233-063F-42B5-8137-9DF3F51BA10A}">
+      <p15:sldGuideLst xmlns:p15="http://schemas.microsoft.com/office/powerpoint/2012/main"/>
+    </p:ext>
+  </p:extLst>
 </p:presentation>
 </file>
 
@@ -254,7 +267,7 @@
           <a:p>
             <a:fld id="{1653FB81-9337-4F75-AD11-0F8EA5C2433C}" type="datetimeFigureOut">
               <a:rPr lang="en-US" smtClean="0"/>
-              <a:t>10/6/2019</a:t>
+              <a:t>7/7/2020</a:t>
             </a:fld>
             <a:endParaRPr lang="en-US"/>
           </a:p>
@@ -452,7 +465,7 @@
           <a:p>
             <a:fld id="{1653FB81-9337-4F75-AD11-0F8EA5C2433C}" type="datetimeFigureOut">
               <a:rPr lang="en-US" smtClean="0"/>
-              <a:t>10/6/2019</a:t>
+              <a:t>7/7/2020</a:t>
             </a:fld>
             <a:endParaRPr lang="en-US"/>
           </a:p>
@@ -660,7 +673,7 @@
           <a:p>
             <a:fld id="{1653FB81-9337-4F75-AD11-0F8EA5C2433C}" type="datetimeFigureOut">
               <a:rPr lang="en-US" smtClean="0"/>
-              <a:t>10/6/2019</a:t>
+              <a:t>7/7/2020</a:t>
             </a:fld>
             <a:endParaRPr lang="en-US"/>
           </a:p>
@@ -858,7 +871,7 @@
           <a:p>
             <a:fld id="{1653FB81-9337-4F75-AD11-0F8EA5C2433C}" type="datetimeFigureOut">
               <a:rPr lang="en-US" smtClean="0"/>
-              <a:t>10/6/2019</a:t>
+              <a:t>7/7/2020</a:t>
             </a:fld>
             <a:endParaRPr lang="en-US"/>
           </a:p>
@@ -1133,7 +1146,7 @@
           <a:p>
             <a:fld id="{1653FB81-9337-4F75-AD11-0F8EA5C2433C}" type="datetimeFigureOut">
               <a:rPr lang="en-US" smtClean="0"/>
-              <a:t>10/6/2019</a:t>
+              <a:t>7/7/2020</a:t>
             </a:fld>
             <a:endParaRPr lang="en-US"/>
           </a:p>
@@ -1398,7 +1411,7 @@
           <a:p>
             <a:fld id="{1653FB81-9337-4F75-AD11-0F8EA5C2433C}" type="datetimeFigureOut">
               <a:rPr lang="en-US" smtClean="0"/>
-              <a:t>10/6/2019</a:t>
+              <a:t>7/7/2020</a:t>
             </a:fld>
             <a:endParaRPr lang="en-US"/>
           </a:p>
@@ -1810,7 +1823,7 @@
           <a:p>
             <a:fld id="{1653FB81-9337-4F75-AD11-0F8EA5C2433C}" type="datetimeFigureOut">
               <a:rPr lang="en-US" smtClean="0"/>
-              <a:t>10/6/2019</a:t>
+              <a:t>7/7/2020</a:t>
             </a:fld>
             <a:endParaRPr lang="en-US"/>
           </a:p>
@@ -1951,7 +1964,7 @@
           <a:p>
             <a:fld id="{1653FB81-9337-4F75-AD11-0F8EA5C2433C}" type="datetimeFigureOut">
               <a:rPr lang="en-US" smtClean="0"/>
-              <a:t>10/6/2019</a:t>
+              <a:t>7/7/2020</a:t>
             </a:fld>
             <a:endParaRPr lang="en-US"/>
           </a:p>
@@ -2064,7 +2077,7 @@
           <a:p>
             <a:fld id="{1653FB81-9337-4F75-AD11-0F8EA5C2433C}" type="datetimeFigureOut">
               <a:rPr lang="en-US" smtClean="0"/>
-              <a:t>10/6/2019</a:t>
+              <a:t>7/7/2020</a:t>
             </a:fld>
             <a:endParaRPr lang="en-US"/>
           </a:p>
@@ -2375,7 +2388,7 @@
           <a:p>
             <a:fld id="{1653FB81-9337-4F75-AD11-0F8EA5C2433C}" type="datetimeFigureOut">
               <a:rPr lang="en-US" smtClean="0"/>
-              <a:t>10/6/2019</a:t>
+              <a:t>7/7/2020</a:t>
             </a:fld>
             <a:endParaRPr lang="en-US"/>
           </a:p>
@@ -2663,7 +2676,7 @@
           <a:p>
             <a:fld id="{1653FB81-9337-4F75-AD11-0F8EA5C2433C}" type="datetimeFigureOut">
               <a:rPr lang="en-US" smtClean="0"/>
-              <a:t>10/6/2019</a:t>
+              <a:t>7/7/2020</a:t>
             </a:fld>
             <a:endParaRPr lang="en-US"/>
           </a:p>
@@ -2904,7 +2917,7 @@
           <a:p>
             <a:fld id="{1653FB81-9337-4F75-AD11-0F8EA5C2433C}" type="datetimeFigureOut">
               <a:rPr lang="en-US" smtClean="0"/>
-              <a:t>10/6/2019</a:t>
+              <a:t>7/7/2020</a:t>
             </a:fld>
             <a:endParaRPr lang="en-US"/>
           </a:p>
@@ -3342,7 +3355,11 @@
           <a:bodyPr/>
           <a:lstStyle/>
           <a:p>
-            <a:endParaRPr lang="en-US"/>
+            <a:r>
+              <a:rPr lang="ru-RU" dirty="0"/>
+              <a:t>Тема </a:t>
+            </a:r>
+            <a:endParaRPr lang="en-US" dirty="0"/>
           </a:p>
         </p:txBody>
       </p:sp>
@@ -3367,7 +3384,7 @@
           <a:bodyPr/>
           <a:lstStyle/>
           <a:p>
-            <a:endParaRPr lang="en-US"/>
+            <a:endParaRPr lang="en-US" dirty="0"/>
           </a:p>
         </p:txBody>
       </p:sp>
@@ -3375,6 +3392,1178 @@
     <p:extLst>
       <p:ext uri="{BB962C8B-B14F-4D97-AF65-F5344CB8AC3E}">
         <p14:creationId xmlns:p14="http://schemas.microsoft.com/office/powerpoint/2010/main" val="2632128186"/>
+      </p:ext>
+    </p:extLst>
+  </p:cSld>
+  <p:clrMapOvr>
+    <a:masterClrMapping/>
+  </p:clrMapOvr>
+</p:sld>
+</file>
+
+<file path=ppt/slides/slide2.xml><?xml version="1.0" encoding="utf-8"?>
+<p:sld xmlns:a="http://schemas.openxmlformats.org/drawingml/2006/main" xmlns:r="http://schemas.openxmlformats.org/officeDocument/2006/relationships" xmlns:p="http://schemas.openxmlformats.org/presentationml/2006/main">
+  <p:cSld>
+    <p:spTree>
+      <p:nvGrpSpPr>
+        <p:cNvPr id="1" name=""/>
+        <p:cNvGrpSpPr/>
+        <p:nvPr/>
+      </p:nvGrpSpPr>
+      <p:grpSpPr>
+        <a:xfrm>
+          <a:off x="0" y="0"/>
+          <a:ext cx="0" cy="0"/>
+          <a:chOff x="0" y="0"/>
+          <a:chExt cx="0" cy="0"/>
+        </a:xfrm>
+      </p:grpSpPr>
+      <p:sp>
+        <p:nvSpPr>
+          <p:cNvPr id="2" name="Title 1">
+            <a:extLst>
+              <a:ext uri="{FF2B5EF4-FFF2-40B4-BE49-F238E27FC236}">
+                <a16:creationId xmlns:a16="http://schemas.microsoft.com/office/drawing/2014/main" id="{EDBD917A-4D57-447F-8824-5166AB22B210}"/>
+              </a:ext>
+            </a:extLst>
+          </p:cNvPr>
+          <p:cNvSpPr>
+            <a:spLocks noGrp="1"/>
+          </p:cNvSpPr>
+          <p:nvPr>
+            <p:ph type="ctrTitle"/>
+          </p:nvPr>
+        </p:nvSpPr>
+        <p:spPr/>
+        <p:txBody>
+          <a:bodyPr/>
+          <a:lstStyle/>
+          <a:p>
+            <a:r>
+              <a:rPr lang="ru-RU" dirty="0"/>
+              <a:t>Почему это важно</a:t>
+            </a:r>
+            <a:endParaRPr lang="en-US" dirty="0"/>
+          </a:p>
+        </p:txBody>
+      </p:sp>
+      <p:sp>
+        <p:nvSpPr>
+          <p:cNvPr id="3" name="Subtitle 2">
+            <a:extLst>
+              <a:ext uri="{FF2B5EF4-FFF2-40B4-BE49-F238E27FC236}">
+                <a16:creationId xmlns:a16="http://schemas.microsoft.com/office/drawing/2014/main" id="{18CED031-0362-4145-870E-E563FDE5A4AB}"/>
+              </a:ext>
+            </a:extLst>
+          </p:cNvPr>
+          <p:cNvSpPr>
+            <a:spLocks noGrp="1"/>
+          </p:cNvSpPr>
+          <p:nvPr>
+            <p:ph type="subTitle" idx="1"/>
+          </p:nvPr>
+        </p:nvSpPr>
+        <p:spPr/>
+        <p:txBody>
+          <a:bodyPr/>
+          <a:lstStyle/>
+          <a:p>
+            <a:endParaRPr lang="en-US" dirty="0"/>
+          </a:p>
+        </p:txBody>
+      </p:sp>
+    </p:spTree>
+    <p:extLst>
+      <p:ext uri="{BB962C8B-B14F-4D97-AF65-F5344CB8AC3E}">
+        <p14:creationId xmlns:p14="http://schemas.microsoft.com/office/powerpoint/2010/main" val="2412873040"/>
+      </p:ext>
+    </p:extLst>
+  </p:cSld>
+  <p:clrMapOvr>
+    <a:masterClrMapping/>
+  </p:clrMapOvr>
+</p:sld>
+</file>
+
+<file path=ppt/slides/slide3.xml><?xml version="1.0" encoding="utf-8"?>
+<p:sld xmlns:a="http://schemas.openxmlformats.org/drawingml/2006/main" xmlns:r="http://schemas.openxmlformats.org/officeDocument/2006/relationships" xmlns:p="http://schemas.openxmlformats.org/presentationml/2006/main">
+  <p:cSld>
+    <p:spTree>
+      <p:nvGrpSpPr>
+        <p:cNvPr id="1" name=""/>
+        <p:cNvGrpSpPr/>
+        <p:nvPr/>
+      </p:nvGrpSpPr>
+      <p:grpSpPr>
+        <a:xfrm>
+          <a:off x="0" y="0"/>
+          <a:ext cx="0" cy="0"/>
+          <a:chOff x="0" y="0"/>
+          <a:chExt cx="0" cy="0"/>
+        </a:xfrm>
+      </p:grpSpPr>
+      <p:sp>
+        <p:nvSpPr>
+          <p:cNvPr id="2" name="Title 1">
+            <a:extLst>
+              <a:ext uri="{FF2B5EF4-FFF2-40B4-BE49-F238E27FC236}">
+                <a16:creationId xmlns:a16="http://schemas.microsoft.com/office/drawing/2014/main" id="{EDBD917A-4D57-447F-8824-5166AB22B210}"/>
+              </a:ext>
+            </a:extLst>
+          </p:cNvPr>
+          <p:cNvSpPr>
+            <a:spLocks noGrp="1"/>
+          </p:cNvSpPr>
+          <p:nvPr>
+            <p:ph type="ctrTitle"/>
+          </p:nvPr>
+        </p:nvSpPr>
+        <p:spPr/>
+        <p:txBody>
+          <a:bodyPr/>
+          <a:lstStyle/>
+          <a:p>
+            <a:r>
+              <a:rPr lang="ru-RU" dirty="0"/>
+              <a:t>Основные понятия и принципы</a:t>
+            </a:r>
+            <a:endParaRPr lang="en-US" dirty="0"/>
+          </a:p>
+        </p:txBody>
+      </p:sp>
+      <p:sp>
+        <p:nvSpPr>
+          <p:cNvPr id="3" name="Subtitle 2">
+            <a:extLst>
+              <a:ext uri="{FF2B5EF4-FFF2-40B4-BE49-F238E27FC236}">
+                <a16:creationId xmlns:a16="http://schemas.microsoft.com/office/drawing/2014/main" id="{18CED031-0362-4145-870E-E563FDE5A4AB}"/>
+              </a:ext>
+            </a:extLst>
+          </p:cNvPr>
+          <p:cNvSpPr>
+            <a:spLocks noGrp="1"/>
+          </p:cNvSpPr>
+          <p:nvPr>
+            <p:ph type="subTitle" idx="1"/>
+          </p:nvPr>
+        </p:nvSpPr>
+        <p:spPr/>
+        <p:txBody>
+          <a:bodyPr/>
+          <a:lstStyle/>
+          <a:p>
+            <a:endParaRPr lang="en-US" dirty="0"/>
+          </a:p>
+        </p:txBody>
+      </p:sp>
+    </p:spTree>
+    <p:extLst>
+      <p:ext uri="{BB962C8B-B14F-4D97-AF65-F5344CB8AC3E}">
+        <p14:creationId xmlns:p14="http://schemas.microsoft.com/office/powerpoint/2010/main" val="3224576476"/>
+      </p:ext>
+    </p:extLst>
+  </p:cSld>
+  <p:clrMapOvr>
+    <a:masterClrMapping/>
+  </p:clrMapOvr>
+</p:sld>
+</file>
+
+<file path=ppt/slides/slide4.xml><?xml version="1.0" encoding="utf-8"?>
+<p:sld xmlns:a="http://schemas.openxmlformats.org/drawingml/2006/main" xmlns:r="http://schemas.openxmlformats.org/officeDocument/2006/relationships" xmlns:p="http://schemas.openxmlformats.org/presentationml/2006/main">
+  <p:cSld>
+    <p:spTree>
+      <p:nvGrpSpPr>
+        <p:cNvPr id="1" name=""/>
+        <p:cNvGrpSpPr/>
+        <p:nvPr/>
+      </p:nvGrpSpPr>
+      <p:grpSpPr>
+        <a:xfrm>
+          <a:off x="0" y="0"/>
+          <a:ext cx="0" cy="0"/>
+          <a:chOff x="0" y="0"/>
+          <a:chExt cx="0" cy="0"/>
+        </a:xfrm>
+      </p:grpSpPr>
+      <p:sp>
+        <p:nvSpPr>
+          <p:cNvPr id="2" name="Title 1">
+            <a:extLst>
+              <a:ext uri="{FF2B5EF4-FFF2-40B4-BE49-F238E27FC236}">
+                <a16:creationId xmlns:a16="http://schemas.microsoft.com/office/drawing/2014/main" id="{EDBD917A-4D57-447F-8824-5166AB22B210}"/>
+              </a:ext>
+            </a:extLst>
+          </p:cNvPr>
+          <p:cNvSpPr>
+            <a:spLocks noGrp="1"/>
+          </p:cNvSpPr>
+          <p:nvPr>
+            <p:ph type="ctrTitle"/>
+          </p:nvPr>
+        </p:nvSpPr>
+        <p:spPr/>
+        <p:txBody>
+          <a:bodyPr/>
+          <a:lstStyle/>
+          <a:p>
+            <a:r>
+              <a:rPr lang="ru-RU" dirty="0"/>
+              <a:t>Основные понятия</a:t>
+            </a:r>
+            <a:endParaRPr lang="en-US" dirty="0"/>
+          </a:p>
+        </p:txBody>
+      </p:sp>
+      <p:sp>
+        <p:nvSpPr>
+          <p:cNvPr id="3" name="Subtitle 2">
+            <a:extLst>
+              <a:ext uri="{FF2B5EF4-FFF2-40B4-BE49-F238E27FC236}">
+                <a16:creationId xmlns:a16="http://schemas.microsoft.com/office/drawing/2014/main" id="{18CED031-0362-4145-870E-E563FDE5A4AB}"/>
+              </a:ext>
+            </a:extLst>
+          </p:cNvPr>
+          <p:cNvSpPr>
+            <a:spLocks noGrp="1"/>
+          </p:cNvSpPr>
+          <p:nvPr>
+            <p:ph type="subTitle" idx="1"/>
+          </p:nvPr>
+        </p:nvSpPr>
+        <p:spPr/>
+        <p:txBody>
+          <a:bodyPr/>
+          <a:lstStyle/>
+          <a:p>
+            <a:endParaRPr lang="en-US" dirty="0"/>
+          </a:p>
+        </p:txBody>
+      </p:sp>
+    </p:spTree>
+    <p:extLst>
+      <p:ext uri="{BB962C8B-B14F-4D97-AF65-F5344CB8AC3E}">
+        <p14:creationId xmlns:p14="http://schemas.microsoft.com/office/powerpoint/2010/main" val="2021241813"/>
+      </p:ext>
+    </p:extLst>
+  </p:cSld>
+  <p:clrMapOvr>
+    <a:masterClrMapping/>
+  </p:clrMapOvr>
+</p:sld>
+</file>
+
+<file path=ppt/slides/slide5.xml><?xml version="1.0" encoding="utf-8"?>
+<p:sld xmlns:a="http://schemas.openxmlformats.org/drawingml/2006/main" xmlns:r="http://schemas.openxmlformats.org/officeDocument/2006/relationships" xmlns:p="http://schemas.openxmlformats.org/presentationml/2006/main">
+  <p:cSld>
+    <p:spTree>
+      <p:nvGrpSpPr>
+        <p:cNvPr id="1" name=""/>
+        <p:cNvGrpSpPr/>
+        <p:nvPr/>
+      </p:nvGrpSpPr>
+      <p:grpSpPr>
+        <a:xfrm>
+          <a:off x="0" y="0"/>
+          <a:ext cx="0" cy="0"/>
+          <a:chOff x="0" y="0"/>
+          <a:chExt cx="0" cy="0"/>
+        </a:xfrm>
+      </p:grpSpPr>
+      <p:sp>
+        <p:nvSpPr>
+          <p:cNvPr id="4" name="Isosceles Triangle 3">
+            <a:extLst>
+              <a:ext uri="{FF2B5EF4-FFF2-40B4-BE49-F238E27FC236}">
+                <a16:creationId xmlns:a16="http://schemas.microsoft.com/office/drawing/2014/main" id="{AFBB4081-D710-4CB2-BC87-7DB7CD16AC71}"/>
+              </a:ext>
+            </a:extLst>
+          </p:cNvPr>
+          <p:cNvSpPr/>
+          <p:nvPr/>
+        </p:nvSpPr>
+        <p:spPr>
+          <a:xfrm>
+            <a:off x="2490952" y="299545"/>
+            <a:ext cx="6789682" cy="6258910"/>
+          </a:xfrm>
+          <a:prstGeom prst="triangle">
+            <a:avLst/>
+          </a:prstGeom>
+        </p:spPr>
+        <p:style>
+          <a:lnRef idx="2">
+            <a:schemeClr val="accent1">
+              <a:shade val="50000"/>
+            </a:schemeClr>
+          </a:lnRef>
+          <a:fillRef idx="1">
+            <a:schemeClr val="accent1"/>
+          </a:fillRef>
+          <a:effectRef idx="0">
+            <a:schemeClr val="accent1"/>
+          </a:effectRef>
+          <a:fontRef idx="minor">
+            <a:schemeClr val="lt1"/>
+          </a:fontRef>
+        </p:style>
+        <p:txBody>
+          <a:bodyPr rtlCol="0" anchor="ctr"/>
+          <a:lstStyle/>
+          <a:p>
+            <a:pPr algn="ctr"/>
+            <a:endParaRPr lang="en-US" b="1" dirty="0"/>
+          </a:p>
+        </p:txBody>
+      </p:sp>
+      <p:sp>
+        <p:nvSpPr>
+          <p:cNvPr id="7" name="TextBox 6">
+            <a:extLst>
+              <a:ext uri="{FF2B5EF4-FFF2-40B4-BE49-F238E27FC236}">
+                <a16:creationId xmlns:a16="http://schemas.microsoft.com/office/drawing/2014/main" id="{6C13E1C1-E1CE-45C1-A33C-02672AB11165}"/>
+              </a:ext>
+            </a:extLst>
+          </p:cNvPr>
+          <p:cNvSpPr txBox="1"/>
+          <p:nvPr/>
+        </p:nvSpPr>
+        <p:spPr>
+          <a:xfrm>
+            <a:off x="3589506" y="5165387"/>
+            <a:ext cx="4367720" cy="369332"/>
+          </a:xfrm>
+          <a:prstGeom prst="rect">
+            <a:avLst/>
+          </a:prstGeom>
+          <a:noFill/>
+        </p:spPr>
+        <p:txBody>
+          <a:bodyPr wrap="square" rtlCol="0">
+            <a:spAutoFit/>
+          </a:bodyPr>
+          <a:lstStyle/>
+          <a:p>
+            <a:r>
+              <a:rPr lang="pl-PL" dirty="0"/>
+              <a:t>Fundamental Skills</a:t>
+            </a:r>
+            <a:endParaRPr lang="en-US" dirty="0"/>
+          </a:p>
+        </p:txBody>
+      </p:sp>
+    </p:spTree>
+    <p:extLst>
+      <p:ext uri="{BB962C8B-B14F-4D97-AF65-F5344CB8AC3E}">
+        <p14:creationId xmlns:p14="http://schemas.microsoft.com/office/powerpoint/2010/main" val="3494007762"/>
+      </p:ext>
+    </p:extLst>
+  </p:cSld>
+  <p:clrMapOvr>
+    <a:masterClrMapping/>
+  </p:clrMapOvr>
+</p:sld>
+</file>
+
+<file path=ppt/slides/slide6.xml><?xml version="1.0" encoding="utf-8"?>
+<p:sld xmlns:a="http://schemas.openxmlformats.org/drawingml/2006/main" xmlns:r="http://schemas.openxmlformats.org/officeDocument/2006/relationships" xmlns:p="http://schemas.openxmlformats.org/presentationml/2006/main">
+  <p:cSld>
+    <p:spTree>
+      <p:nvGrpSpPr>
+        <p:cNvPr id="1" name=""/>
+        <p:cNvGrpSpPr/>
+        <p:nvPr/>
+      </p:nvGrpSpPr>
+      <p:grpSpPr>
+        <a:xfrm>
+          <a:off x="0" y="0"/>
+          <a:ext cx="0" cy="0"/>
+          <a:chOff x="0" y="0"/>
+          <a:chExt cx="0" cy="0"/>
+        </a:xfrm>
+      </p:grpSpPr>
+      <p:sp>
+        <p:nvSpPr>
+          <p:cNvPr id="4" name="Isosceles Triangle 3">
+            <a:extLst>
+              <a:ext uri="{FF2B5EF4-FFF2-40B4-BE49-F238E27FC236}">
+                <a16:creationId xmlns:a16="http://schemas.microsoft.com/office/drawing/2014/main" id="{AFBB4081-D710-4CB2-BC87-7DB7CD16AC71}"/>
+              </a:ext>
+            </a:extLst>
+          </p:cNvPr>
+          <p:cNvSpPr/>
+          <p:nvPr/>
+        </p:nvSpPr>
+        <p:spPr>
+          <a:xfrm>
+            <a:off x="2490952" y="299545"/>
+            <a:ext cx="6789682" cy="6258910"/>
+          </a:xfrm>
+          <a:prstGeom prst="triangle">
+            <a:avLst/>
+          </a:prstGeom>
+        </p:spPr>
+        <p:style>
+          <a:lnRef idx="2">
+            <a:schemeClr val="accent1">
+              <a:shade val="50000"/>
+            </a:schemeClr>
+          </a:lnRef>
+          <a:fillRef idx="1">
+            <a:schemeClr val="accent1"/>
+          </a:fillRef>
+          <a:effectRef idx="0">
+            <a:schemeClr val="accent1"/>
+          </a:effectRef>
+          <a:fontRef idx="minor">
+            <a:schemeClr val="lt1"/>
+          </a:fontRef>
+        </p:style>
+        <p:txBody>
+          <a:bodyPr rtlCol="0" anchor="ctr"/>
+          <a:lstStyle/>
+          <a:p>
+            <a:pPr algn="ctr"/>
+            <a:endParaRPr lang="en-US"/>
+          </a:p>
+        </p:txBody>
+      </p:sp>
+      <p:sp>
+        <p:nvSpPr>
+          <p:cNvPr id="2" name="TextBox 1">
+            <a:extLst>
+              <a:ext uri="{FF2B5EF4-FFF2-40B4-BE49-F238E27FC236}">
+                <a16:creationId xmlns:a16="http://schemas.microsoft.com/office/drawing/2014/main" id="{632F0CAE-6A58-442E-A4ED-2CDCFAA23348}"/>
+              </a:ext>
+            </a:extLst>
+          </p:cNvPr>
+          <p:cNvSpPr txBox="1"/>
+          <p:nvPr/>
+        </p:nvSpPr>
+        <p:spPr>
+          <a:xfrm>
+            <a:off x="3589506" y="5165387"/>
+            <a:ext cx="4367720" cy="369332"/>
+          </a:xfrm>
+          <a:prstGeom prst="rect">
+            <a:avLst/>
+          </a:prstGeom>
+          <a:noFill/>
+        </p:spPr>
+        <p:txBody>
+          <a:bodyPr wrap="square" rtlCol="0">
+            <a:spAutoFit/>
+          </a:bodyPr>
+          <a:lstStyle/>
+          <a:p>
+            <a:r>
+              <a:rPr lang="pl-PL" dirty="0"/>
+              <a:t>Fundamental Skills</a:t>
+            </a:r>
+            <a:endParaRPr lang="en-US" dirty="0"/>
+          </a:p>
+        </p:txBody>
+      </p:sp>
+      <p:sp>
+        <p:nvSpPr>
+          <p:cNvPr id="6" name="TextBox 5">
+            <a:extLst>
+              <a:ext uri="{FF2B5EF4-FFF2-40B4-BE49-F238E27FC236}">
+                <a16:creationId xmlns:a16="http://schemas.microsoft.com/office/drawing/2014/main" id="{521AE221-19B3-4D0F-B207-867BA604E404}"/>
+              </a:ext>
+            </a:extLst>
+          </p:cNvPr>
+          <p:cNvSpPr txBox="1"/>
+          <p:nvPr/>
+        </p:nvSpPr>
+        <p:spPr>
+          <a:xfrm>
+            <a:off x="3589506" y="4796055"/>
+            <a:ext cx="4367720" cy="369332"/>
+          </a:xfrm>
+          <a:prstGeom prst="rect">
+            <a:avLst/>
+          </a:prstGeom>
+          <a:noFill/>
+        </p:spPr>
+        <p:txBody>
+          <a:bodyPr wrap="square" rtlCol="0">
+            <a:spAutoFit/>
+          </a:bodyPr>
+          <a:lstStyle/>
+          <a:p>
+            <a:r>
+              <a:rPr lang="pl-PL" dirty="0"/>
+              <a:t>Personal Skills</a:t>
+            </a:r>
+            <a:endParaRPr lang="en-US" dirty="0"/>
+          </a:p>
+        </p:txBody>
+      </p:sp>
+    </p:spTree>
+    <p:extLst>
+      <p:ext uri="{BB962C8B-B14F-4D97-AF65-F5344CB8AC3E}">
+        <p14:creationId xmlns:p14="http://schemas.microsoft.com/office/powerpoint/2010/main" val="1489968120"/>
+      </p:ext>
+    </p:extLst>
+  </p:cSld>
+  <p:clrMapOvr>
+    <a:masterClrMapping/>
+  </p:clrMapOvr>
+</p:sld>
+</file>
+
+<file path=ppt/slides/slide7.xml><?xml version="1.0" encoding="utf-8"?>
+<p:sld xmlns:a="http://schemas.openxmlformats.org/drawingml/2006/main" xmlns:r="http://schemas.openxmlformats.org/officeDocument/2006/relationships" xmlns:p="http://schemas.openxmlformats.org/presentationml/2006/main">
+  <p:cSld>
+    <p:spTree>
+      <p:nvGrpSpPr>
+        <p:cNvPr id="1" name=""/>
+        <p:cNvGrpSpPr/>
+        <p:nvPr/>
+      </p:nvGrpSpPr>
+      <p:grpSpPr>
+        <a:xfrm>
+          <a:off x="0" y="0"/>
+          <a:ext cx="0" cy="0"/>
+          <a:chOff x="0" y="0"/>
+          <a:chExt cx="0" cy="0"/>
+        </a:xfrm>
+      </p:grpSpPr>
+      <p:sp>
+        <p:nvSpPr>
+          <p:cNvPr id="4" name="Isosceles Triangle 3">
+            <a:extLst>
+              <a:ext uri="{FF2B5EF4-FFF2-40B4-BE49-F238E27FC236}">
+                <a16:creationId xmlns:a16="http://schemas.microsoft.com/office/drawing/2014/main" id="{AFBB4081-D710-4CB2-BC87-7DB7CD16AC71}"/>
+              </a:ext>
+            </a:extLst>
+          </p:cNvPr>
+          <p:cNvSpPr/>
+          <p:nvPr/>
+        </p:nvSpPr>
+        <p:spPr>
+          <a:xfrm>
+            <a:off x="2490952" y="299545"/>
+            <a:ext cx="6789682" cy="6258910"/>
+          </a:xfrm>
+          <a:prstGeom prst="triangle">
+            <a:avLst/>
+          </a:prstGeom>
+        </p:spPr>
+        <p:style>
+          <a:lnRef idx="2">
+            <a:schemeClr val="accent1">
+              <a:shade val="50000"/>
+            </a:schemeClr>
+          </a:lnRef>
+          <a:fillRef idx="1">
+            <a:schemeClr val="accent1"/>
+          </a:fillRef>
+          <a:effectRef idx="0">
+            <a:schemeClr val="accent1"/>
+          </a:effectRef>
+          <a:fontRef idx="minor">
+            <a:schemeClr val="lt1"/>
+          </a:fontRef>
+        </p:style>
+        <p:txBody>
+          <a:bodyPr rtlCol="0" anchor="ctr"/>
+          <a:lstStyle/>
+          <a:p>
+            <a:pPr algn="ctr"/>
+            <a:endParaRPr lang="en-US"/>
+          </a:p>
+        </p:txBody>
+      </p:sp>
+      <p:sp>
+        <p:nvSpPr>
+          <p:cNvPr id="2" name="TextBox 1">
+            <a:extLst>
+              <a:ext uri="{FF2B5EF4-FFF2-40B4-BE49-F238E27FC236}">
+                <a16:creationId xmlns:a16="http://schemas.microsoft.com/office/drawing/2014/main" id="{632F0CAE-6A58-442E-A4ED-2CDCFAA23348}"/>
+              </a:ext>
+            </a:extLst>
+          </p:cNvPr>
+          <p:cNvSpPr txBox="1"/>
+          <p:nvPr/>
+        </p:nvSpPr>
+        <p:spPr>
+          <a:xfrm>
+            <a:off x="3589506" y="5165387"/>
+            <a:ext cx="4367720" cy="369332"/>
+          </a:xfrm>
+          <a:prstGeom prst="rect">
+            <a:avLst/>
+          </a:prstGeom>
+          <a:noFill/>
+        </p:spPr>
+        <p:txBody>
+          <a:bodyPr wrap="square" rtlCol="0">
+            <a:spAutoFit/>
+          </a:bodyPr>
+          <a:lstStyle/>
+          <a:p>
+            <a:r>
+              <a:rPr lang="pl-PL" dirty="0"/>
+              <a:t>Fundamental Skills</a:t>
+            </a:r>
+            <a:endParaRPr lang="en-US" dirty="0"/>
+          </a:p>
+        </p:txBody>
+      </p:sp>
+      <p:sp>
+        <p:nvSpPr>
+          <p:cNvPr id="6" name="TextBox 5">
+            <a:extLst>
+              <a:ext uri="{FF2B5EF4-FFF2-40B4-BE49-F238E27FC236}">
+                <a16:creationId xmlns:a16="http://schemas.microsoft.com/office/drawing/2014/main" id="{521AE221-19B3-4D0F-B207-867BA604E404}"/>
+              </a:ext>
+            </a:extLst>
+          </p:cNvPr>
+          <p:cNvSpPr txBox="1"/>
+          <p:nvPr/>
+        </p:nvSpPr>
+        <p:spPr>
+          <a:xfrm>
+            <a:off x="3589506" y="4796055"/>
+            <a:ext cx="4367720" cy="369332"/>
+          </a:xfrm>
+          <a:prstGeom prst="rect">
+            <a:avLst/>
+          </a:prstGeom>
+          <a:noFill/>
+        </p:spPr>
+        <p:txBody>
+          <a:bodyPr wrap="square" rtlCol="0">
+            <a:spAutoFit/>
+          </a:bodyPr>
+          <a:lstStyle/>
+          <a:p>
+            <a:r>
+              <a:rPr lang="pl-PL" dirty="0"/>
+              <a:t>Personal Skills</a:t>
+            </a:r>
+            <a:endParaRPr lang="en-US" dirty="0"/>
+          </a:p>
+        </p:txBody>
+      </p:sp>
+      <p:sp>
+        <p:nvSpPr>
+          <p:cNvPr id="3" name="TextBox 2">
+            <a:extLst>
+              <a:ext uri="{FF2B5EF4-FFF2-40B4-BE49-F238E27FC236}">
+                <a16:creationId xmlns:a16="http://schemas.microsoft.com/office/drawing/2014/main" id="{39C62DCD-1075-4DF0-AD86-2E881FE4BB42}"/>
+              </a:ext>
+            </a:extLst>
+          </p:cNvPr>
+          <p:cNvSpPr txBox="1"/>
+          <p:nvPr/>
+        </p:nvSpPr>
+        <p:spPr>
+          <a:xfrm>
+            <a:off x="3589506" y="4426723"/>
+            <a:ext cx="4367720" cy="369332"/>
+          </a:xfrm>
+          <a:prstGeom prst="rect">
+            <a:avLst/>
+          </a:prstGeom>
+          <a:noFill/>
+        </p:spPr>
+        <p:txBody>
+          <a:bodyPr wrap="square" rtlCol="0">
+            <a:spAutoFit/>
+          </a:bodyPr>
+          <a:lstStyle/>
+          <a:p>
+            <a:r>
+              <a:rPr lang="pl-PL" dirty="0"/>
+              <a:t>Soft Skills</a:t>
+            </a:r>
+            <a:endParaRPr lang="en-US" dirty="0"/>
+          </a:p>
+        </p:txBody>
+      </p:sp>
+    </p:spTree>
+    <p:extLst>
+      <p:ext uri="{BB962C8B-B14F-4D97-AF65-F5344CB8AC3E}">
+        <p14:creationId xmlns:p14="http://schemas.microsoft.com/office/powerpoint/2010/main" val="822411419"/>
+      </p:ext>
+    </p:extLst>
+  </p:cSld>
+  <p:clrMapOvr>
+    <a:masterClrMapping/>
+  </p:clrMapOvr>
+</p:sld>
+</file>
+
+<file path=ppt/slides/slide8.xml><?xml version="1.0" encoding="utf-8"?>
+<p:sld xmlns:a="http://schemas.openxmlformats.org/drawingml/2006/main" xmlns:r="http://schemas.openxmlformats.org/officeDocument/2006/relationships" xmlns:p="http://schemas.openxmlformats.org/presentationml/2006/main">
+  <p:cSld>
+    <p:spTree>
+      <p:nvGrpSpPr>
+        <p:cNvPr id="1" name=""/>
+        <p:cNvGrpSpPr/>
+        <p:nvPr/>
+      </p:nvGrpSpPr>
+      <p:grpSpPr>
+        <a:xfrm>
+          <a:off x="0" y="0"/>
+          <a:ext cx="0" cy="0"/>
+          <a:chOff x="0" y="0"/>
+          <a:chExt cx="0" cy="0"/>
+        </a:xfrm>
+      </p:grpSpPr>
+      <p:sp>
+        <p:nvSpPr>
+          <p:cNvPr id="4" name="Isosceles Triangle 3">
+            <a:extLst>
+              <a:ext uri="{FF2B5EF4-FFF2-40B4-BE49-F238E27FC236}">
+                <a16:creationId xmlns:a16="http://schemas.microsoft.com/office/drawing/2014/main" id="{AFBB4081-D710-4CB2-BC87-7DB7CD16AC71}"/>
+              </a:ext>
+            </a:extLst>
+          </p:cNvPr>
+          <p:cNvSpPr/>
+          <p:nvPr/>
+        </p:nvSpPr>
+        <p:spPr>
+          <a:xfrm>
+            <a:off x="2490952" y="299545"/>
+            <a:ext cx="6789682" cy="6258910"/>
+          </a:xfrm>
+          <a:prstGeom prst="triangle">
+            <a:avLst/>
+          </a:prstGeom>
+        </p:spPr>
+        <p:style>
+          <a:lnRef idx="2">
+            <a:schemeClr val="accent1">
+              <a:shade val="50000"/>
+            </a:schemeClr>
+          </a:lnRef>
+          <a:fillRef idx="1">
+            <a:schemeClr val="accent1"/>
+          </a:fillRef>
+          <a:effectRef idx="0">
+            <a:schemeClr val="accent1"/>
+          </a:effectRef>
+          <a:fontRef idx="minor">
+            <a:schemeClr val="lt1"/>
+          </a:fontRef>
+        </p:style>
+        <p:txBody>
+          <a:bodyPr rtlCol="0" anchor="ctr"/>
+          <a:lstStyle/>
+          <a:p>
+            <a:pPr algn="ctr"/>
+            <a:endParaRPr lang="en-US"/>
+          </a:p>
+        </p:txBody>
+      </p:sp>
+      <p:sp>
+        <p:nvSpPr>
+          <p:cNvPr id="2" name="TextBox 1">
+            <a:extLst>
+              <a:ext uri="{FF2B5EF4-FFF2-40B4-BE49-F238E27FC236}">
+                <a16:creationId xmlns:a16="http://schemas.microsoft.com/office/drawing/2014/main" id="{632F0CAE-6A58-442E-A4ED-2CDCFAA23348}"/>
+              </a:ext>
+            </a:extLst>
+          </p:cNvPr>
+          <p:cNvSpPr txBox="1"/>
+          <p:nvPr/>
+        </p:nvSpPr>
+        <p:spPr>
+          <a:xfrm>
+            <a:off x="3589506" y="5165387"/>
+            <a:ext cx="4367720" cy="369332"/>
+          </a:xfrm>
+          <a:prstGeom prst="rect">
+            <a:avLst/>
+          </a:prstGeom>
+          <a:noFill/>
+        </p:spPr>
+        <p:txBody>
+          <a:bodyPr wrap="square" rtlCol="0">
+            <a:spAutoFit/>
+          </a:bodyPr>
+          <a:lstStyle/>
+          <a:p>
+            <a:r>
+              <a:rPr lang="pl-PL" dirty="0"/>
+              <a:t>Fundamental Skills</a:t>
+            </a:r>
+            <a:endParaRPr lang="en-US" dirty="0"/>
+          </a:p>
+        </p:txBody>
+      </p:sp>
+      <p:sp>
+        <p:nvSpPr>
+          <p:cNvPr id="6" name="TextBox 5">
+            <a:extLst>
+              <a:ext uri="{FF2B5EF4-FFF2-40B4-BE49-F238E27FC236}">
+                <a16:creationId xmlns:a16="http://schemas.microsoft.com/office/drawing/2014/main" id="{521AE221-19B3-4D0F-B207-867BA604E404}"/>
+              </a:ext>
+            </a:extLst>
+          </p:cNvPr>
+          <p:cNvSpPr txBox="1"/>
+          <p:nvPr/>
+        </p:nvSpPr>
+        <p:spPr>
+          <a:xfrm>
+            <a:off x="3589506" y="4796055"/>
+            <a:ext cx="4367720" cy="369332"/>
+          </a:xfrm>
+          <a:prstGeom prst="rect">
+            <a:avLst/>
+          </a:prstGeom>
+          <a:noFill/>
+        </p:spPr>
+        <p:txBody>
+          <a:bodyPr wrap="square" rtlCol="0">
+            <a:spAutoFit/>
+          </a:bodyPr>
+          <a:lstStyle/>
+          <a:p>
+            <a:r>
+              <a:rPr lang="pl-PL" dirty="0"/>
+              <a:t>Personal Skills</a:t>
+            </a:r>
+            <a:endParaRPr lang="en-US" dirty="0"/>
+          </a:p>
+        </p:txBody>
+      </p:sp>
+      <p:sp>
+        <p:nvSpPr>
+          <p:cNvPr id="3" name="TextBox 2">
+            <a:extLst>
+              <a:ext uri="{FF2B5EF4-FFF2-40B4-BE49-F238E27FC236}">
+                <a16:creationId xmlns:a16="http://schemas.microsoft.com/office/drawing/2014/main" id="{39C62DCD-1075-4DF0-AD86-2E881FE4BB42}"/>
+              </a:ext>
+            </a:extLst>
+          </p:cNvPr>
+          <p:cNvSpPr txBox="1"/>
+          <p:nvPr/>
+        </p:nvSpPr>
+        <p:spPr>
+          <a:xfrm>
+            <a:off x="3589506" y="4426723"/>
+            <a:ext cx="4367720" cy="369332"/>
+          </a:xfrm>
+          <a:prstGeom prst="rect">
+            <a:avLst/>
+          </a:prstGeom>
+          <a:noFill/>
+        </p:spPr>
+        <p:txBody>
+          <a:bodyPr wrap="square" rtlCol="0">
+            <a:spAutoFit/>
+          </a:bodyPr>
+          <a:lstStyle/>
+          <a:p>
+            <a:r>
+              <a:rPr lang="pl-PL" dirty="0"/>
+              <a:t>Soft Skills</a:t>
+            </a:r>
+            <a:endParaRPr lang="en-US" dirty="0"/>
+          </a:p>
+        </p:txBody>
+      </p:sp>
+      <p:sp>
+        <p:nvSpPr>
+          <p:cNvPr id="5" name="TextBox 4">
+            <a:extLst>
+              <a:ext uri="{FF2B5EF4-FFF2-40B4-BE49-F238E27FC236}">
+                <a16:creationId xmlns:a16="http://schemas.microsoft.com/office/drawing/2014/main" id="{84CEDD8A-1033-4B6E-8CC4-D220320C01F7}"/>
+              </a:ext>
+            </a:extLst>
+          </p:cNvPr>
+          <p:cNvSpPr txBox="1"/>
+          <p:nvPr/>
+        </p:nvSpPr>
+        <p:spPr>
+          <a:xfrm>
+            <a:off x="3589506" y="4057391"/>
+            <a:ext cx="4367720" cy="369332"/>
+          </a:xfrm>
+          <a:prstGeom prst="rect">
+            <a:avLst/>
+          </a:prstGeom>
+          <a:noFill/>
+        </p:spPr>
+        <p:txBody>
+          <a:bodyPr wrap="square" rtlCol="0">
+            <a:spAutoFit/>
+          </a:bodyPr>
+          <a:lstStyle/>
+          <a:p>
+            <a:r>
+              <a:rPr lang="pl-PL" dirty="0"/>
+              <a:t>Proffesional Core Skills</a:t>
+            </a:r>
+            <a:endParaRPr lang="en-US" dirty="0"/>
+          </a:p>
+        </p:txBody>
+      </p:sp>
+    </p:spTree>
+    <p:extLst>
+      <p:ext uri="{BB962C8B-B14F-4D97-AF65-F5344CB8AC3E}">
+        <p14:creationId xmlns:p14="http://schemas.microsoft.com/office/powerpoint/2010/main" val="7110587"/>
+      </p:ext>
+    </p:extLst>
+  </p:cSld>
+  <p:clrMapOvr>
+    <a:masterClrMapping/>
+  </p:clrMapOvr>
+</p:sld>
+</file>
+
+<file path=ppt/slides/slide9.xml><?xml version="1.0" encoding="utf-8"?>
+<p:sld xmlns:a="http://schemas.openxmlformats.org/drawingml/2006/main" xmlns:r="http://schemas.openxmlformats.org/officeDocument/2006/relationships" xmlns:p="http://schemas.openxmlformats.org/presentationml/2006/main">
+  <p:cSld>
+    <p:spTree>
+      <p:nvGrpSpPr>
+        <p:cNvPr id="1" name=""/>
+        <p:cNvGrpSpPr/>
+        <p:nvPr/>
+      </p:nvGrpSpPr>
+      <p:grpSpPr>
+        <a:xfrm>
+          <a:off x="0" y="0"/>
+          <a:ext cx="0" cy="0"/>
+          <a:chOff x="0" y="0"/>
+          <a:chExt cx="0" cy="0"/>
+        </a:xfrm>
+      </p:grpSpPr>
+      <p:sp>
+        <p:nvSpPr>
+          <p:cNvPr id="4" name="Isosceles Triangle 3">
+            <a:extLst>
+              <a:ext uri="{FF2B5EF4-FFF2-40B4-BE49-F238E27FC236}">
+                <a16:creationId xmlns:a16="http://schemas.microsoft.com/office/drawing/2014/main" id="{AFBB4081-D710-4CB2-BC87-7DB7CD16AC71}"/>
+              </a:ext>
+            </a:extLst>
+          </p:cNvPr>
+          <p:cNvSpPr/>
+          <p:nvPr/>
+        </p:nvSpPr>
+        <p:spPr>
+          <a:xfrm>
+            <a:off x="2490952" y="299545"/>
+            <a:ext cx="6789682" cy="6258910"/>
+          </a:xfrm>
+          <a:prstGeom prst="triangle">
+            <a:avLst/>
+          </a:prstGeom>
+        </p:spPr>
+        <p:style>
+          <a:lnRef idx="2">
+            <a:schemeClr val="accent1">
+              <a:shade val="50000"/>
+            </a:schemeClr>
+          </a:lnRef>
+          <a:fillRef idx="1">
+            <a:schemeClr val="accent1"/>
+          </a:fillRef>
+          <a:effectRef idx="0">
+            <a:schemeClr val="accent1"/>
+          </a:effectRef>
+          <a:fontRef idx="minor">
+            <a:schemeClr val="lt1"/>
+          </a:fontRef>
+        </p:style>
+        <p:txBody>
+          <a:bodyPr rtlCol="0" anchor="ctr"/>
+          <a:lstStyle/>
+          <a:p>
+            <a:pPr algn="ctr"/>
+            <a:endParaRPr lang="en-US"/>
+          </a:p>
+        </p:txBody>
+      </p:sp>
+      <p:sp>
+        <p:nvSpPr>
+          <p:cNvPr id="2" name="TextBox 1">
+            <a:extLst>
+              <a:ext uri="{FF2B5EF4-FFF2-40B4-BE49-F238E27FC236}">
+                <a16:creationId xmlns:a16="http://schemas.microsoft.com/office/drawing/2014/main" id="{632F0CAE-6A58-442E-A4ED-2CDCFAA23348}"/>
+              </a:ext>
+            </a:extLst>
+          </p:cNvPr>
+          <p:cNvSpPr txBox="1"/>
+          <p:nvPr/>
+        </p:nvSpPr>
+        <p:spPr>
+          <a:xfrm>
+            <a:off x="3589506" y="5165387"/>
+            <a:ext cx="4367720" cy="369332"/>
+          </a:xfrm>
+          <a:prstGeom prst="rect">
+            <a:avLst/>
+          </a:prstGeom>
+          <a:noFill/>
+        </p:spPr>
+        <p:txBody>
+          <a:bodyPr wrap="square" rtlCol="0">
+            <a:spAutoFit/>
+          </a:bodyPr>
+          <a:lstStyle/>
+          <a:p>
+            <a:r>
+              <a:rPr lang="pl-PL" dirty="0"/>
+              <a:t>Fundamental Skills</a:t>
+            </a:r>
+            <a:endParaRPr lang="en-US" dirty="0"/>
+          </a:p>
+        </p:txBody>
+      </p:sp>
+      <p:sp>
+        <p:nvSpPr>
+          <p:cNvPr id="6" name="TextBox 5">
+            <a:extLst>
+              <a:ext uri="{FF2B5EF4-FFF2-40B4-BE49-F238E27FC236}">
+                <a16:creationId xmlns:a16="http://schemas.microsoft.com/office/drawing/2014/main" id="{521AE221-19B3-4D0F-B207-867BA604E404}"/>
+              </a:ext>
+            </a:extLst>
+          </p:cNvPr>
+          <p:cNvSpPr txBox="1"/>
+          <p:nvPr/>
+        </p:nvSpPr>
+        <p:spPr>
+          <a:xfrm>
+            <a:off x="3589506" y="4796055"/>
+            <a:ext cx="4367720" cy="369332"/>
+          </a:xfrm>
+          <a:prstGeom prst="rect">
+            <a:avLst/>
+          </a:prstGeom>
+          <a:noFill/>
+        </p:spPr>
+        <p:txBody>
+          <a:bodyPr wrap="square" rtlCol="0">
+            <a:spAutoFit/>
+          </a:bodyPr>
+          <a:lstStyle/>
+          <a:p>
+            <a:r>
+              <a:rPr lang="pl-PL" dirty="0"/>
+              <a:t>Personal Skills</a:t>
+            </a:r>
+            <a:endParaRPr lang="en-US" dirty="0"/>
+          </a:p>
+        </p:txBody>
+      </p:sp>
+      <p:sp>
+        <p:nvSpPr>
+          <p:cNvPr id="3" name="TextBox 2">
+            <a:extLst>
+              <a:ext uri="{FF2B5EF4-FFF2-40B4-BE49-F238E27FC236}">
+                <a16:creationId xmlns:a16="http://schemas.microsoft.com/office/drawing/2014/main" id="{39C62DCD-1075-4DF0-AD86-2E881FE4BB42}"/>
+              </a:ext>
+            </a:extLst>
+          </p:cNvPr>
+          <p:cNvSpPr txBox="1"/>
+          <p:nvPr/>
+        </p:nvSpPr>
+        <p:spPr>
+          <a:xfrm>
+            <a:off x="3589506" y="4426723"/>
+            <a:ext cx="4367720" cy="369332"/>
+          </a:xfrm>
+          <a:prstGeom prst="rect">
+            <a:avLst/>
+          </a:prstGeom>
+          <a:noFill/>
+        </p:spPr>
+        <p:txBody>
+          <a:bodyPr wrap="square" rtlCol="0">
+            <a:spAutoFit/>
+          </a:bodyPr>
+          <a:lstStyle/>
+          <a:p>
+            <a:r>
+              <a:rPr lang="pl-PL" dirty="0"/>
+              <a:t>Soft Skills</a:t>
+            </a:r>
+            <a:endParaRPr lang="en-US" dirty="0"/>
+          </a:p>
+        </p:txBody>
+      </p:sp>
+      <p:sp>
+        <p:nvSpPr>
+          <p:cNvPr id="5" name="TextBox 4">
+            <a:extLst>
+              <a:ext uri="{FF2B5EF4-FFF2-40B4-BE49-F238E27FC236}">
+                <a16:creationId xmlns:a16="http://schemas.microsoft.com/office/drawing/2014/main" id="{84CEDD8A-1033-4B6E-8CC4-D220320C01F7}"/>
+              </a:ext>
+            </a:extLst>
+          </p:cNvPr>
+          <p:cNvSpPr txBox="1"/>
+          <p:nvPr/>
+        </p:nvSpPr>
+        <p:spPr>
+          <a:xfrm>
+            <a:off x="3589506" y="4057391"/>
+            <a:ext cx="4367720" cy="369332"/>
+          </a:xfrm>
+          <a:prstGeom prst="rect">
+            <a:avLst/>
+          </a:prstGeom>
+          <a:noFill/>
+        </p:spPr>
+        <p:txBody>
+          <a:bodyPr wrap="square" rtlCol="0">
+            <a:spAutoFit/>
+          </a:bodyPr>
+          <a:lstStyle/>
+          <a:p>
+            <a:r>
+              <a:rPr lang="pl-PL" dirty="0"/>
+              <a:t>Proffesional Core Skills</a:t>
+            </a:r>
+            <a:endParaRPr lang="en-US" dirty="0"/>
+          </a:p>
+        </p:txBody>
+      </p:sp>
+      <p:sp>
+        <p:nvSpPr>
+          <p:cNvPr id="8" name="TextBox 7">
+            <a:extLst>
+              <a:ext uri="{FF2B5EF4-FFF2-40B4-BE49-F238E27FC236}">
+                <a16:creationId xmlns:a16="http://schemas.microsoft.com/office/drawing/2014/main" id="{CB75256A-B769-4F7D-9CC2-C471F1A5F516}"/>
+              </a:ext>
+            </a:extLst>
+          </p:cNvPr>
+          <p:cNvSpPr txBox="1"/>
+          <p:nvPr/>
+        </p:nvSpPr>
+        <p:spPr>
+          <a:xfrm>
+            <a:off x="3589506" y="3688697"/>
+            <a:ext cx="4367720" cy="369332"/>
+          </a:xfrm>
+          <a:prstGeom prst="rect">
+            <a:avLst/>
+          </a:prstGeom>
+          <a:noFill/>
+        </p:spPr>
+        <p:txBody>
+          <a:bodyPr wrap="square" rtlCol="0">
+            <a:spAutoFit/>
+          </a:bodyPr>
+          <a:lstStyle/>
+          <a:p>
+            <a:r>
+              <a:rPr lang="pl-PL" dirty="0"/>
+              <a:t>Use Proffesional Skills</a:t>
+            </a:r>
+            <a:endParaRPr lang="en-US" dirty="0"/>
+          </a:p>
+        </p:txBody>
+      </p:sp>
+    </p:spTree>
+    <p:extLst>
+      <p:ext uri="{BB962C8B-B14F-4D97-AF65-F5344CB8AC3E}">
+        <p14:creationId xmlns:p14="http://schemas.microsoft.com/office/powerpoint/2010/main" val="2839683852"/>
       </p:ext>
     </p:extLst>
   </p:cSld>

</xml_diff>

<commit_message>
update pptx for self management
</commit_message>
<xml_diff>
--- a/softskills/self management/self_management.pptx
+++ b/softskills/self management/self_management.pptx
@@ -17,8 +17,13 @@
     <p:sldId id="269" r:id="rId11"/>
     <p:sldId id="272" r:id="rId12"/>
     <p:sldId id="276" r:id="rId13"/>
-    <p:sldId id="273" r:id="rId14"/>
-    <p:sldId id="274" r:id="rId15"/>
+    <p:sldId id="283" r:id="rId14"/>
+    <p:sldId id="273" r:id="rId15"/>
+    <p:sldId id="274" r:id="rId16"/>
+    <p:sldId id="278" r:id="rId17"/>
+    <p:sldId id="279" r:id="rId18"/>
+    <p:sldId id="280" r:id="rId19"/>
+    <p:sldId id="282" r:id="rId20"/>
   </p:sldIdLst>
   <p:sldSz cx="12192000" cy="6858000"/>
   <p:notesSz cx="6858000" cy="9144000"/>
@@ -272,7 +277,7 @@
           <a:p>
             <a:fld id="{1653FB81-9337-4F75-AD11-0F8EA5C2433C}" type="datetimeFigureOut">
               <a:rPr lang="en-US" smtClean="0"/>
-              <a:t>7/8/2020</a:t>
+              <a:t>7/9/2020</a:t>
             </a:fld>
             <a:endParaRPr lang="en-US"/>
           </a:p>
@@ -470,7 +475,7 @@
           <a:p>
             <a:fld id="{1653FB81-9337-4F75-AD11-0F8EA5C2433C}" type="datetimeFigureOut">
               <a:rPr lang="en-US" smtClean="0"/>
-              <a:t>7/8/2020</a:t>
+              <a:t>7/9/2020</a:t>
             </a:fld>
             <a:endParaRPr lang="en-US"/>
           </a:p>
@@ -678,7 +683,7 @@
           <a:p>
             <a:fld id="{1653FB81-9337-4F75-AD11-0F8EA5C2433C}" type="datetimeFigureOut">
               <a:rPr lang="en-US" smtClean="0"/>
-              <a:t>7/8/2020</a:t>
+              <a:t>7/9/2020</a:t>
             </a:fld>
             <a:endParaRPr lang="en-US"/>
           </a:p>
@@ -876,7 +881,7 @@
           <a:p>
             <a:fld id="{1653FB81-9337-4F75-AD11-0F8EA5C2433C}" type="datetimeFigureOut">
               <a:rPr lang="en-US" smtClean="0"/>
-              <a:t>7/8/2020</a:t>
+              <a:t>7/9/2020</a:t>
             </a:fld>
             <a:endParaRPr lang="en-US"/>
           </a:p>
@@ -1151,7 +1156,7 @@
           <a:p>
             <a:fld id="{1653FB81-9337-4F75-AD11-0F8EA5C2433C}" type="datetimeFigureOut">
               <a:rPr lang="en-US" smtClean="0"/>
-              <a:t>7/8/2020</a:t>
+              <a:t>7/9/2020</a:t>
             </a:fld>
             <a:endParaRPr lang="en-US"/>
           </a:p>
@@ -1416,7 +1421,7 @@
           <a:p>
             <a:fld id="{1653FB81-9337-4F75-AD11-0F8EA5C2433C}" type="datetimeFigureOut">
               <a:rPr lang="en-US" smtClean="0"/>
-              <a:t>7/8/2020</a:t>
+              <a:t>7/9/2020</a:t>
             </a:fld>
             <a:endParaRPr lang="en-US"/>
           </a:p>
@@ -1828,7 +1833,7 @@
           <a:p>
             <a:fld id="{1653FB81-9337-4F75-AD11-0F8EA5C2433C}" type="datetimeFigureOut">
               <a:rPr lang="en-US" smtClean="0"/>
-              <a:t>7/8/2020</a:t>
+              <a:t>7/9/2020</a:t>
             </a:fld>
             <a:endParaRPr lang="en-US"/>
           </a:p>
@@ -1969,7 +1974,7 @@
           <a:p>
             <a:fld id="{1653FB81-9337-4F75-AD11-0F8EA5C2433C}" type="datetimeFigureOut">
               <a:rPr lang="en-US" smtClean="0"/>
-              <a:t>7/8/2020</a:t>
+              <a:t>7/9/2020</a:t>
             </a:fld>
             <a:endParaRPr lang="en-US"/>
           </a:p>
@@ -2082,7 +2087,7 @@
           <a:p>
             <a:fld id="{1653FB81-9337-4F75-AD11-0F8EA5C2433C}" type="datetimeFigureOut">
               <a:rPr lang="en-US" smtClean="0"/>
-              <a:t>7/8/2020</a:t>
+              <a:t>7/9/2020</a:t>
             </a:fld>
             <a:endParaRPr lang="en-US"/>
           </a:p>
@@ -2393,7 +2398,7 @@
           <a:p>
             <a:fld id="{1653FB81-9337-4F75-AD11-0F8EA5C2433C}" type="datetimeFigureOut">
               <a:rPr lang="en-US" smtClean="0"/>
-              <a:t>7/8/2020</a:t>
+              <a:t>7/9/2020</a:t>
             </a:fld>
             <a:endParaRPr lang="en-US"/>
           </a:p>
@@ -2681,7 +2686,7 @@
           <a:p>
             <a:fld id="{1653FB81-9337-4F75-AD11-0F8EA5C2433C}" type="datetimeFigureOut">
               <a:rPr lang="en-US" smtClean="0"/>
-              <a:t>7/8/2020</a:t>
+              <a:t>7/9/2020</a:t>
             </a:fld>
             <a:endParaRPr lang="en-US"/>
           </a:p>
@@ -2922,7 +2927,7 @@
           <a:p>
             <a:fld id="{1653FB81-9337-4F75-AD11-0F8EA5C2433C}" type="datetimeFigureOut">
               <a:rPr lang="en-US" smtClean="0"/>
-              <a:t>7/8/2020</a:t>
+              <a:t>7/9/2020</a:t>
             </a:fld>
             <a:endParaRPr lang="en-US"/>
           </a:p>
@@ -3648,7 +3653,11 @@
             <a:pPr algn="ctr"/>
             <a:r>
               <a:rPr lang="pl-PL" sz="2800" dirty="0"/>
-              <a:t>Core Proffesional</a:t>
+              <a:t>Core Prof</a:t>
+            </a:r>
+            <a:r>
+              <a:rPr lang="ru-RU" sz="2800" dirty="0"/>
+              <a:t>.</a:t>
             </a:r>
             <a:r>
               <a:rPr lang="en-US" sz="2800" dirty="0"/>
@@ -3692,26 +3701,30 @@
           <a:p>
             <a:pPr algn="ctr"/>
             <a:r>
-              <a:rPr lang="pl-PL" sz="2800" dirty="0"/>
+              <a:rPr lang="pl-PL" sz="2800" b="1" dirty="0"/>
               <a:t>Use </a:t>
             </a:r>
-            <a:endParaRPr lang="en-US" sz="2800" dirty="0"/>
+            <a:endParaRPr lang="en-US" sz="2800" b="1" dirty="0"/>
           </a:p>
           <a:p>
             <a:pPr algn="ctr"/>
             <a:r>
-              <a:rPr lang="pl-PL" sz="2800" dirty="0"/>
-              <a:t>Proffesional </a:t>
-            </a:r>
-            <a:endParaRPr lang="en-US" sz="2800" dirty="0"/>
+              <a:rPr lang="pl-PL" sz="2800" b="1" dirty="0"/>
+              <a:t>Prof</a:t>
+            </a:r>
+            <a:r>
+              <a:rPr lang="ru-RU" sz="2800" b="1" dirty="0"/>
+              <a:t>.</a:t>
+            </a:r>
+            <a:endParaRPr lang="en-US" sz="2800" b="1" dirty="0"/>
           </a:p>
           <a:p>
             <a:pPr algn="ctr"/>
             <a:r>
-              <a:rPr lang="pl-PL" sz="2800" dirty="0"/>
+              <a:rPr lang="pl-PL" sz="2800" b="1" dirty="0"/>
               <a:t>Skills</a:t>
             </a:r>
-            <a:endParaRPr lang="en-US" sz="2800" dirty="0"/>
+            <a:endParaRPr lang="en-US" sz="2800" b="1" dirty="0"/>
           </a:p>
         </p:txBody>
       </p:sp>
@@ -4158,8 +4171,8 @@
         </p:nvSpPr>
         <p:spPr>
           <a:xfrm>
-            <a:off x="804484" y="940391"/>
-            <a:ext cx="10021446" cy="2944457"/>
+            <a:off x="155643" y="940391"/>
+            <a:ext cx="11877471" cy="2944457"/>
           </a:xfrm>
         </p:spPr>
         <p:txBody>
@@ -4168,7 +4181,6 @@
           </a:bodyPr>
           <a:lstStyle/>
           <a:p>
-            <a:pPr algn="l"/>
             <a:r>
               <a:rPr lang="en-US" sz="2800" dirty="0">
                 <a:solidFill>
@@ -4473,8 +4485,8 @@
         </p:nvSpPr>
         <p:spPr>
           <a:xfrm>
-            <a:off x="804484" y="940391"/>
-            <a:ext cx="10021446" cy="2944457"/>
+            <a:off x="136187" y="940391"/>
+            <a:ext cx="11916383" cy="2944457"/>
           </a:xfrm>
         </p:spPr>
         <p:txBody>
@@ -4483,7 +4495,6 @@
           </a:bodyPr>
           <a:lstStyle/>
           <a:p>
-            <a:pPr algn="l"/>
             <a:r>
               <a:rPr lang="en-US" sz="2800" dirty="0">
                 <a:solidFill>
@@ -4804,201 +4815,36 @@
         </p:nvSpPr>
         <p:spPr>
           <a:xfrm>
-            <a:off x="0" y="208114"/>
-            <a:ext cx="10021446" cy="3639985"/>
+            <a:off x="126460" y="940391"/>
+            <a:ext cx="11926110" cy="2944457"/>
           </a:xfrm>
         </p:spPr>
         <p:txBody>
           <a:bodyPr anchor="ctr">
-            <a:noAutofit/>
+            <a:normAutofit/>
           </a:bodyPr>
           <a:lstStyle/>
           <a:p>
-            <a:pPr algn="l"/>
-            <a:r>
-              <a:rPr lang="pl-PL" sz="2800" dirty="0">
-                <a:solidFill>
-                  <a:srgbClr val="000000"/>
-                </a:solidFill>
-              </a:rPr>
-              <a:t>	</a:t>
-            </a:r>
             <a:r>
               <a:rPr lang="en-US" sz="2800" dirty="0">
                 <a:solidFill>
                   <a:srgbClr val="000000"/>
                 </a:solidFill>
               </a:rPr>
-              <a:t>1) What should I do </a:t>
-            </a:r>
-            <a:br>
-              <a:rPr lang="pl-PL" sz="2800" dirty="0">
-                <a:solidFill>
-                  <a:srgbClr val="000000"/>
-                </a:solidFill>
-              </a:rPr>
-            </a:br>
-            <a:r>
-              <a:rPr lang="pl-PL" sz="2800" dirty="0">
-                <a:solidFill>
-                  <a:srgbClr val="000000"/>
-                </a:solidFill>
-              </a:rPr>
-              <a:t>	</a:t>
-            </a:r>
-            <a:r>
-              <a:rPr lang="en-US" sz="2800" dirty="0">
-                <a:solidFill>
-                  <a:srgbClr val="000000"/>
-                </a:solidFill>
-              </a:rPr>
-              <a:t>2) Why should I do this </a:t>
-            </a:r>
-            <a:br>
-              <a:rPr lang="pl-PL" sz="2800" dirty="0">
-                <a:solidFill>
-                  <a:srgbClr val="000000"/>
-                </a:solidFill>
-              </a:rPr>
-            </a:br>
-            <a:r>
-              <a:rPr lang="pl-PL" sz="2800" dirty="0">
-                <a:solidFill>
-                  <a:srgbClr val="000000"/>
-                </a:solidFill>
-              </a:rPr>
-              <a:t>	</a:t>
-            </a:r>
-            <a:r>
-              <a:rPr lang="en-US" sz="2800" dirty="0">
-                <a:solidFill>
-                  <a:srgbClr val="000000"/>
-                </a:solidFill>
-              </a:rPr>
-              <a:t>3) Why is it important </a:t>
-            </a:r>
-            <a:br>
-              <a:rPr lang="pl-PL" sz="2800" dirty="0">
-                <a:solidFill>
-                  <a:srgbClr val="000000"/>
-                </a:solidFill>
-              </a:rPr>
-            </a:br>
-            <a:r>
-              <a:rPr lang="pl-PL" sz="2800" dirty="0">
-                <a:solidFill>
-                  <a:srgbClr val="000000"/>
-                </a:solidFill>
-              </a:rPr>
-              <a:t>	</a:t>
-            </a:r>
-            <a:r>
-              <a:rPr lang="en-US" sz="2800" dirty="0">
-                <a:solidFill>
-                  <a:srgbClr val="000000"/>
-                </a:solidFill>
-              </a:rPr>
-              <a:t>4) How can I do this </a:t>
-            </a:r>
-            <a:br>
-              <a:rPr lang="pl-PL" sz="2800" dirty="0">
-                <a:solidFill>
-                  <a:srgbClr val="000000"/>
-                </a:solidFill>
-              </a:rPr>
-            </a:br>
-            <a:r>
-              <a:rPr lang="pl-PL" sz="2800" dirty="0">
-                <a:solidFill>
-                  <a:srgbClr val="000000"/>
-                </a:solidFill>
-              </a:rPr>
-              <a:t>	</a:t>
-            </a:r>
-            <a:r>
-              <a:rPr lang="en-US" sz="2800" dirty="0">
-                <a:solidFill>
-                  <a:srgbClr val="000000"/>
-                </a:solidFill>
-              </a:rPr>
-              <a:t>5) What are the limitations </a:t>
-            </a:r>
-            <a:br>
-              <a:rPr lang="pl-PL" sz="2800" dirty="0">
-                <a:solidFill>
-                  <a:srgbClr val="000000"/>
-                </a:solidFill>
-              </a:rPr>
-            </a:br>
-            <a:r>
-              <a:rPr lang="pl-PL" sz="2800" dirty="0">
-                <a:solidFill>
-                  <a:srgbClr val="000000"/>
-                </a:solidFill>
-              </a:rPr>
-              <a:t>	</a:t>
-            </a:r>
-            <a:r>
-              <a:rPr lang="en-US" sz="2800" dirty="0">
-                <a:solidFill>
-                  <a:srgbClr val="000000"/>
-                </a:solidFill>
-              </a:rPr>
-              <a:t>6) What difficulties may arise </a:t>
-            </a:r>
-            <a:br>
-              <a:rPr lang="pl-PL" sz="2800" dirty="0">
-                <a:solidFill>
-                  <a:srgbClr val="000000"/>
-                </a:solidFill>
-              </a:rPr>
-            </a:br>
-            <a:r>
-              <a:rPr lang="pl-PL" sz="2800" dirty="0">
-                <a:solidFill>
-                  <a:srgbClr val="000000"/>
-                </a:solidFill>
-              </a:rPr>
-              <a:t>	</a:t>
-            </a:r>
-            <a:r>
-              <a:rPr lang="en-US" sz="2800" dirty="0">
-                <a:solidFill>
-                  <a:srgbClr val="000000"/>
-                </a:solidFill>
-              </a:rPr>
-              <a:t>7) Where can affect </a:t>
-            </a:r>
-            <a:br>
-              <a:rPr lang="pl-PL" sz="2800" dirty="0">
-                <a:solidFill>
-                  <a:srgbClr val="000000"/>
-                </a:solidFill>
-              </a:rPr>
-            </a:br>
-            <a:r>
-              <a:rPr lang="pl-PL" sz="2800" dirty="0">
-                <a:solidFill>
-                  <a:srgbClr val="000000"/>
-                </a:solidFill>
-              </a:rPr>
-              <a:t>	</a:t>
-            </a:r>
-            <a:r>
-              <a:rPr lang="en-US" sz="2800" dirty="0">
-                <a:solidFill>
-                  <a:srgbClr val="000000"/>
-                </a:solidFill>
-              </a:rPr>
-              <a:t>8) How long will it take</a:t>
-            </a:r>
+              <a:t>Do what you can, with what you have, where you are. (Theodore Roosevelt)</a:t>
+            </a:r>
+            <a:endParaRPr lang="ru-RU" sz="2800" dirty="0">
+              <a:solidFill>
+                <a:srgbClr val="000000"/>
+              </a:solidFill>
+            </a:endParaRPr>
           </a:p>
         </p:txBody>
       </p:sp>
     </p:spTree>
     <p:extLst>
       <p:ext uri="{BB962C8B-B14F-4D97-AF65-F5344CB8AC3E}">
-        <p14:creationId xmlns:p14="http://schemas.microsoft.com/office/powerpoint/2010/main" val="4116578862"/>
+        <p14:creationId xmlns:p14="http://schemas.microsoft.com/office/powerpoint/2010/main" val="2835565176"/>
       </p:ext>
     </p:extLst>
   </p:cSld>
@@ -5384,13 +5230,105 @@
               </a:rPr>
               <a:t>4) How can I do this </a:t>
             </a:r>
+            <a:br>
+              <a:rPr lang="pl-PL" sz="2800" dirty="0">
+                <a:solidFill>
+                  <a:srgbClr val="000000"/>
+                </a:solidFill>
+              </a:rPr>
+            </a:br>
+            <a:r>
+              <a:rPr lang="pl-PL" sz="2800" dirty="0">
+                <a:solidFill>
+                  <a:srgbClr val="000000"/>
+                </a:solidFill>
+              </a:rPr>
+              <a:t>	</a:t>
+            </a:r>
+            <a:r>
+              <a:rPr lang="en-US" sz="2800" dirty="0">
+                <a:solidFill>
+                  <a:srgbClr val="000000"/>
+                </a:solidFill>
+              </a:rPr>
+              <a:t>5) What are the limitations </a:t>
+            </a:r>
+            <a:br>
+              <a:rPr lang="pl-PL" sz="2800" dirty="0">
+                <a:solidFill>
+                  <a:srgbClr val="000000"/>
+                </a:solidFill>
+              </a:rPr>
+            </a:br>
+            <a:r>
+              <a:rPr lang="pl-PL" sz="2800" dirty="0">
+                <a:solidFill>
+                  <a:srgbClr val="000000"/>
+                </a:solidFill>
+              </a:rPr>
+              <a:t>	</a:t>
+            </a:r>
+            <a:r>
+              <a:rPr lang="en-US" sz="2800" dirty="0">
+                <a:solidFill>
+                  <a:srgbClr val="000000"/>
+                </a:solidFill>
+              </a:rPr>
+              <a:t>6) What difficulties may arise </a:t>
+            </a:r>
+            <a:br>
+              <a:rPr lang="pl-PL" sz="2800" dirty="0">
+                <a:solidFill>
+                  <a:srgbClr val="000000"/>
+                </a:solidFill>
+              </a:rPr>
+            </a:br>
+            <a:r>
+              <a:rPr lang="pl-PL" sz="2800" dirty="0">
+                <a:solidFill>
+                  <a:srgbClr val="000000"/>
+                </a:solidFill>
+              </a:rPr>
+              <a:t>	</a:t>
+            </a:r>
+            <a:r>
+              <a:rPr lang="en-US" sz="2800" dirty="0">
+                <a:solidFill>
+                  <a:srgbClr val="000000"/>
+                </a:solidFill>
+              </a:rPr>
+              <a:t>7) Where can affect </a:t>
+            </a:r>
+            <a:br>
+              <a:rPr lang="pl-PL" sz="2800" dirty="0">
+                <a:solidFill>
+                  <a:srgbClr val="000000"/>
+                </a:solidFill>
+              </a:rPr>
+            </a:br>
+            <a:r>
+              <a:rPr lang="pl-PL" sz="2800" dirty="0">
+                <a:solidFill>
+                  <a:srgbClr val="000000"/>
+                </a:solidFill>
+              </a:rPr>
+              <a:t>	</a:t>
+            </a:r>
+            <a:r>
+              <a:rPr lang="en-US" sz="2800" dirty="0">
+                <a:solidFill>
+                  <a:srgbClr val="000000"/>
+                </a:solidFill>
+              </a:rPr>
+              <a:t>8) How long will it take</a:t>
+            </a:r>
           </a:p>
         </p:txBody>
       </p:sp>
     </p:spTree>
     <p:extLst>
       <p:ext uri="{BB962C8B-B14F-4D97-AF65-F5344CB8AC3E}">
-        <p14:creationId xmlns:p14="http://schemas.microsoft.com/office/powerpoint/2010/main" val="2207579628"/>
+        <p14:creationId xmlns:p14="http://schemas.microsoft.com/office/powerpoint/2010/main" val="4116578862"/>
       </p:ext>
     </p:extLst>
   </p:cSld>
@@ -5400,7 +5338,7 @@
 </p:sld>
 </file>
 
-<file path=ppt/slides/slide2.xml><?xml version="1.0" encoding="utf-8"?>
+<file path=ppt/slides/slide15.xml><?xml version="1.0" encoding="utf-8"?>
 <p:sld xmlns:a="http://schemas.openxmlformats.org/drawingml/2006/main" xmlns:r="http://schemas.openxmlformats.org/officeDocument/2006/relationships" xmlns:p="http://schemas.openxmlformats.org/presentationml/2006/main">
   <p:cSld>
     <p:bg>
@@ -5680,32 +5618,101 @@
         </p:nvSpPr>
         <p:spPr>
           <a:xfrm>
-            <a:off x="804484" y="940391"/>
-            <a:ext cx="10021446" cy="2944457"/>
+            <a:off x="0" y="208114"/>
+            <a:ext cx="10021446" cy="3639985"/>
           </a:xfrm>
         </p:spPr>
         <p:txBody>
           <a:bodyPr anchor="ctr">
-            <a:normAutofit/>
+            <a:noAutofit/>
           </a:bodyPr>
           <a:lstStyle/>
           <a:p>
             <a:pPr algn="l"/>
             <a:r>
-              <a:rPr lang="pl-PL" sz="6600" dirty="0">
+              <a:rPr lang="pl-PL" sz="2800" dirty="0">
                 <a:solidFill>
                   <a:srgbClr val="000000"/>
                 </a:solidFill>
               </a:rPr>
-              <a:t>What is it</a:t>
-            </a:r>
-            <a:r>
-              <a:rPr lang="en-US" sz="6600" dirty="0">
+              <a:t>	</a:t>
+            </a:r>
+            <a:r>
+              <a:rPr lang="en-US" sz="2800" dirty="0">
                 <a:solidFill>
                   <a:srgbClr val="000000"/>
                 </a:solidFill>
               </a:rPr>
-              <a:t>?</a:t>
+              <a:t>1) What should I do </a:t>
+            </a:r>
+            <a:br>
+              <a:rPr lang="pl-PL" sz="2800" dirty="0">
+                <a:solidFill>
+                  <a:srgbClr val="000000"/>
+                </a:solidFill>
+              </a:rPr>
+            </a:br>
+            <a:r>
+              <a:rPr lang="pl-PL" sz="2800" dirty="0">
+                <a:solidFill>
+                  <a:srgbClr val="000000"/>
+                </a:solidFill>
+              </a:rPr>
+              <a:t>	</a:t>
+            </a:r>
+            <a:r>
+              <a:rPr lang="en-US" sz="2800" dirty="0">
+                <a:solidFill>
+                  <a:srgbClr val="000000"/>
+                </a:solidFill>
+              </a:rPr>
+              <a:t>2) Why should I do this </a:t>
+            </a:r>
+            <a:br>
+              <a:rPr lang="pl-PL" sz="2800" dirty="0">
+                <a:solidFill>
+                  <a:srgbClr val="000000"/>
+                </a:solidFill>
+              </a:rPr>
+            </a:br>
+            <a:r>
+              <a:rPr lang="pl-PL" sz="2800" dirty="0">
+                <a:solidFill>
+                  <a:srgbClr val="000000"/>
+                </a:solidFill>
+              </a:rPr>
+              <a:t>	</a:t>
+            </a:r>
+            <a:r>
+              <a:rPr lang="en-US" sz="2800" dirty="0">
+                <a:solidFill>
+                  <a:srgbClr val="000000"/>
+                </a:solidFill>
+              </a:rPr>
+              <a:t>3) Why is it important </a:t>
+            </a:r>
+            <a:br>
+              <a:rPr lang="pl-PL" sz="2800" dirty="0">
+                <a:solidFill>
+                  <a:srgbClr val="000000"/>
+                </a:solidFill>
+              </a:rPr>
+            </a:br>
+            <a:r>
+              <a:rPr lang="pl-PL" sz="2800" dirty="0">
+                <a:solidFill>
+                  <a:srgbClr val="000000"/>
+                </a:solidFill>
+              </a:rPr>
+              <a:t>	</a:t>
+            </a:r>
+            <a:r>
+              <a:rPr lang="en-US" sz="2800" dirty="0">
+                <a:solidFill>
+                  <a:srgbClr val="000000"/>
+                </a:solidFill>
+              </a:rPr>
+              <a:t>4) How can I do this </a:t>
             </a:r>
           </a:p>
         </p:txBody>
@@ -5713,7 +5720,7 @@
     </p:spTree>
     <p:extLst>
       <p:ext uri="{BB962C8B-B14F-4D97-AF65-F5344CB8AC3E}">
-        <p14:creationId xmlns:p14="http://schemas.microsoft.com/office/powerpoint/2010/main" val="2510152813"/>
+        <p14:creationId xmlns:p14="http://schemas.microsoft.com/office/powerpoint/2010/main" val="2207579628"/>
       </p:ext>
     </p:extLst>
   </p:cSld>
@@ -5723,7 +5730,7 @@
 </p:sld>
 </file>
 
-<file path=ppt/slides/slide3.xml><?xml version="1.0" encoding="utf-8"?>
+<file path=ppt/slides/slide16.xml><?xml version="1.0" encoding="utf-8"?>
 <p:sld xmlns:a="http://schemas.openxmlformats.org/drawingml/2006/main" xmlns:r="http://schemas.openxmlformats.org/officeDocument/2006/relationships" xmlns:p="http://schemas.openxmlformats.org/presentationml/2006/main">
   <p:cSld>
     <p:bg>
@@ -6003,26 +6010,26 @@
         </p:nvSpPr>
         <p:spPr>
           <a:xfrm>
-            <a:off x="804484" y="940391"/>
-            <a:ext cx="10021446" cy="2944457"/>
+            <a:off x="172050" y="189175"/>
+            <a:ext cx="10021446" cy="657648"/>
           </a:xfrm>
         </p:spPr>
         <p:txBody>
           <a:bodyPr anchor="ctr">
-            <a:normAutofit/>
+            <a:noAutofit/>
           </a:bodyPr>
           <a:lstStyle/>
           <a:p>
             <a:pPr algn="l"/>
             <a:r>
-              <a:rPr lang="pl-PL" sz="6600" dirty="0">
+              <a:rPr lang="pl-PL" sz="2800" b="1" dirty="0">
                 <a:solidFill>
                   <a:srgbClr val="000000"/>
                 </a:solidFill>
               </a:rPr>
-              <a:t>The problem</a:t>
-            </a:r>
-            <a:endParaRPr lang="en-US" sz="6600" dirty="0">
+              <a:t>Fundamental Skills</a:t>
+            </a:r>
+            <a:endParaRPr lang="en-US" sz="2800" b="1" dirty="0">
               <a:solidFill>
                 <a:srgbClr val="000000"/>
               </a:solidFill>
@@ -6030,10 +6037,105 @@
           </a:p>
         </p:txBody>
       </p:sp>
+      <p:sp>
+        <p:nvSpPr>
+          <p:cNvPr id="6" name="Title 1">
+            <a:extLst>
+              <a:ext uri="{FF2B5EF4-FFF2-40B4-BE49-F238E27FC236}">
+                <a16:creationId xmlns:a16="http://schemas.microsoft.com/office/drawing/2014/main" id="{3F421ECC-FD62-4D78-9131-EDE751F80DB6}"/>
+              </a:ext>
+            </a:extLst>
+          </p:cNvPr>
+          <p:cNvSpPr txBox="1">
+            <a:spLocks/>
+          </p:cNvSpPr>
+          <p:nvPr/>
+        </p:nvSpPr>
+        <p:spPr>
+          <a:xfrm>
+            <a:off x="172050" y="961602"/>
+            <a:ext cx="10021446" cy="3049324"/>
+          </a:xfrm>
+          <a:prstGeom prst="rect">
+            <a:avLst/>
+          </a:prstGeom>
+        </p:spPr>
+        <p:txBody>
+          <a:bodyPr vert="horz" lIns="91440" tIns="45720" rIns="91440" bIns="45720" rtlCol="0" anchor="ctr">
+            <a:noAutofit/>
+          </a:bodyPr>
+          <a:lstStyle>
+            <a:lvl1pPr algn="ctr" defTabSz="914400" rtl="0" eaLnBrk="1" latinLnBrk="0" hangingPunct="1">
+              <a:lnSpc>
+                <a:spcPct val="90000"/>
+              </a:lnSpc>
+              <a:spcBef>
+                <a:spcPct val="0"/>
+              </a:spcBef>
+              <a:buNone/>
+              <a:defRPr sz="6000" kern="1200">
+                <a:solidFill>
+                  <a:schemeClr val="tx1"/>
+                </a:solidFill>
+                <a:latin typeface="+mj-lt"/>
+                <a:ea typeface="+mj-ea"/>
+                <a:cs typeface="+mj-cs"/>
+              </a:defRPr>
+            </a:lvl1pPr>
+          </a:lstStyle>
+          <a:p>
+            <a:pPr marL="457200" indent="-457200" algn="l">
+              <a:buFont typeface="Arial" panose="020B0604020202020204" pitchFamily="34" charset="0"/>
+              <a:buChar char="•"/>
+            </a:pPr>
+            <a:r>
+              <a:rPr lang="pl-PL" sz="2800" dirty="0">
+                <a:solidFill>
+                  <a:srgbClr val="000000"/>
+                </a:solidFill>
+              </a:rPr>
+              <a:t>Psychological health</a:t>
+            </a:r>
+            <a:endParaRPr lang="ru-RU" sz="2800" dirty="0">
+              <a:solidFill>
+                <a:srgbClr val="000000"/>
+              </a:solidFill>
+            </a:endParaRPr>
+          </a:p>
+          <a:p>
+            <a:pPr marL="457200" indent="-457200" algn="l">
+              <a:buFont typeface="Arial" panose="020B0604020202020204" pitchFamily="34" charset="0"/>
+              <a:buChar char="•"/>
+            </a:pPr>
+            <a:r>
+              <a:rPr lang="pl-PL" sz="2800" dirty="0">
+                <a:solidFill>
+                  <a:srgbClr val="000000"/>
+                </a:solidFill>
+              </a:rPr>
+              <a:t>Physical health</a:t>
+            </a:r>
+          </a:p>
+          <a:p>
+            <a:pPr marL="457200" indent="-457200" algn="l">
+              <a:buFont typeface="Arial" panose="020B0604020202020204" pitchFamily="34" charset="0"/>
+              <a:buChar char="•"/>
+            </a:pPr>
+            <a:r>
+              <a:rPr lang="en-US" sz="2800" dirty="0">
+                <a:solidFill>
+                  <a:srgbClr val="000000"/>
+                </a:solidFill>
+              </a:rPr>
+              <a:t>Mental health</a:t>
+            </a:r>
+          </a:p>
+        </p:txBody>
+      </p:sp>
     </p:spTree>
     <p:extLst>
       <p:ext uri="{BB962C8B-B14F-4D97-AF65-F5344CB8AC3E}">
-        <p14:creationId xmlns:p14="http://schemas.microsoft.com/office/powerpoint/2010/main" val="2412873040"/>
+        <p14:creationId xmlns:p14="http://schemas.microsoft.com/office/powerpoint/2010/main" val="4176812249"/>
       </p:ext>
     </p:extLst>
   </p:cSld>
@@ -6043,7 +6145,7 @@
 </p:sld>
 </file>
 
-<file path=ppt/slides/slide4.xml><?xml version="1.0" encoding="utf-8"?>
+<file path=ppt/slides/slide17.xml><?xml version="1.0" encoding="utf-8"?>
 <p:sld xmlns:a="http://schemas.openxmlformats.org/drawingml/2006/main" xmlns:r="http://schemas.openxmlformats.org/officeDocument/2006/relationships" xmlns:p="http://schemas.openxmlformats.org/presentationml/2006/main">
   <p:cSld>
     <p:bg>
@@ -6323,32 +6425,100 @@
         </p:nvSpPr>
         <p:spPr>
           <a:xfrm>
-            <a:off x="804484" y="940391"/>
-            <a:ext cx="10021446" cy="2944457"/>
+            <a:off x="172050" y="189175"/>
+            <a:ext cx="10021446" cy="657648"/>
           </a:xfrm>
         </p:spPr>
         <p:txBody>
           <a:bodyPr anchor="ctr">
-            <a:normAutofit/>
+            <a:noAutofit/>
           </a:bodyPr>
           <a:lstStyle/>
           <a:p>
             <a:pPr algn="l"/>
             <a:r>
-              <a:rPr lang="en-US" sz="6600" dirty="0">
+              <a:rPr lang="pl-PL" sz="2800" b="1" dirty="0">
                 <a:solidFill>
                   <a:srgbClr val="000000"/>
                 </a:solidFill>
               </a:rPr>
-              <a:t>Why is it important?</a:t>
-            </a:r>
+              <a:t>Fundamental Skills</a:t>
+            </a:r>
+            <a:endParaRPr lang="en-US" sz="2800" b="1" dirty="0">
+              <a:solidFill>
+                <a:srgbClr val="000000"/>
+              </a:solidFill>
+            </a:endParaRPr>
+          </a:p>
+        </p:txBody>
+      </p:sp>
+      <p:sp>
+        <p:nvSpPr>
+          <p:cNvPr id="6" name="Title 1">
+            <a:extLst>
+              <a:ext uri="{FF2B5EF4-FFF2-40B4-BE49-F238E27FC236}">
+                <a16:creationId xmlns:a16="http://schemas.microsoft.com/office/drawing/2014/main" id="{3F421ECC-FD62-4D78-9131-EDE751F80DB6}"/>
+              </a:ext>
+            </a:extLst>
+          </p:cNvPr>
+          <p:cNvSpPr txBox="1">
+            <a:spLocks/>
+          </p:cNvSpPr>
+          <p:nvPr/>
+        </p:nvSpPr>
+        <p:spPr>
+          <a:xfrm>
+            <a:off x="172049" y="961602"/>
+            <a:ext cx="11851337" cy="3049324"/>
+          </a:xfrm>
+          <a:prstGeom prst="rect">
+            <a:avLst/>
+          </a:prstGeom>
+        </p:spPr>
+        <p:txBody>
+          <a:bodyPr vert="horz" lIns="91440" tIns="45720" rIns="91440" bIns="45720" rtlCol="0" anchor="ctr">
+            <a:noAutofit/>
+          </a:bodyPr>
+          <a:lstStyle>
+            <a:lvl1pPr algn="ctr" defTabSz="914400" rtl="0" eaLnBrk="1" latinLnBrk="0" hangingPunct="1">
+              <a:lnSpc>
+                <a:spcPct val="90000"/>
+              </a:lnSpc>
+              <a:spcBef>
+                <a:spcPct val="0"/>
+              </a:spcBef>
+              <a:buNone/>
+              <a:defRPr sz="6000" kern="1200">
+                <a:solidFill>
+                  <a:schemeClr val="tx1"/>
+                </a:solidFill>
+                <a:latin typeface="+mj-lt"/>
+                <a:ea typeface="+mj-ea"/>
+                <a:cs typeface="+mj-cs"/>
+              </a:defRPr>
+            </a:lvl1pPr>
+          </a:lstStyle>
+          <a:p>
+            <a:r>
+              <a:rPr lang="pl-PL" sz="2800" dirty="0">
+                <a:solidFill>
+                  <a:srgbClr val="000000"/>
+                </a:solidFill>
+              </a:rPr>
+              <a:t>Psychological health</a:t>
+            </a:r>
+            <a:endParaRPr lang="ru-RU" sz="2800" dirty="0">
+              <a:solidFill>
+                <a:srgbClr val="000000"/>
+              </a:solidFill>
+            </a:endParaRPr>
           </a:p>
         </p:txBody>
       </p:sp>
     </p:spTree>
     <p:extLst>
       <p:ext uri="{BB962C8B-B14F-4D97-AF65-F5344CB8AC3E}">
-        <p14:creationId xmlns:p14="http://schemas.microsoft.com/office/powerpoint/2010/main" val="1424455108"/>
+        <p14:creationId xmlns:p14="http://schemas.microsoft.com/office/powerpoint/2010/main" val="388954731"/>
       </p:ext>
     </p:extLst>
   </p:cSld>
@@ -6358,7 +6528,7 @@
 </p:sld>
 </file>
 
-<file path=ppt/slides/slide5.xml><?xml version="1.0" encoding="utf-8"?>
+<file path=ppt/slides/slide18.xml><?xml version="1.0" encoding="utf-8"?>
 <p:sld xmlns:a="http://schemas.openxmlformats.org/drawingml/2006/main" xmlns:r="http://schemas.openxmlformats.org/officeDocument/2006/relationships" xmlns:p="http://schemas.openxmlformats.org/presentationml/2006/main">
   <p:cSld>
     <p:bg>
@@ -6638,6 +6808,1720 @@
         </p:nvSpPr>
         <p:spPr>
           <a:xfrm>
+            <a:off x="172050" y="189175"/>
+            <a:ext cx="10021446" cy="657648"/>
+          </a:xfrm>
+        </p:spPr>
+        <p:txBody>
+          <a:bodyPr anchor="ctr">
+            <a:noAutofit/>
+          </a:bodyPr>
+          <a:lstStyle/>
+          <a:p>
+            <a:pPr algn="l"/>
+            <a:r>
+              <a:rPr lang="pl-PL" sz="2800" b="1" dirty="0">
+                <a:solidFill>
+                  <a:srgbClr val="000000"/>
+                </a:solidFill>
+              </a:rPr>
+              <a:t>Fundamental Skills</a:t>
+            </a:r>
+            <a:endParaRPr lang="en-US" sz="2800" b="1" dirty="0">
+              <a:solidFill>
+                <a:srgbClr val="000000"/>
+              </a:solidFill>
+            </a:endParaRPr>
+          </a:p>
+        </p:txBody>
+      </p:sp>
+      <p:sp>
+        <p:nvSpPr>
+          <p:cNvPr id="6" name="Title 1">
+            <a:extLst>
+              <a:ext uri="{FF2B5EF4-FFF2-40B4-BE49-F238E27FC236}">
+                <a16:creationId xmlns:a16="http://schemas.microsoft.com/office/drawing/2014/main" id="{3F421ECC-FD62-4D78-9131-EDE751F80DB6}"/>
+              </a:ext>
+            </a:extLst>
+          </p:cNvPr>
+          <p:cNvSpPr txBox="1">
+            <a:spLocks/>
+          </p:cNvSpPr>
+          <p:nvPr/>
+        </p:nvSpPr>
+        <p:spPr>
+          <a:xfrm>
+            <a:off x="172049" y="961602"/>
+            <a:ext cx="11851337" cy="3049324"/>
+          </a:xfrm>
+          <a:prstGeom prst="rect">
+            <a:avLst/>
+          </a:prstGeom>
+        </p:spPr>
+        <p:txBody>
+          <a:bodyPr vert="horz" lIns="91440" tIns="45720" rIns="91440" bIns="45720" rtlCol="0" anchor="ctr">
+            <a:noAutofit/>
+          </a:bodyPr>
+          <a:lstStyle>
+            <a:lvl1pPr algn="ctr" defTabSz="914400" rtl="0" eaLnBrk="1" latinLnBrk="0" hangingPunct="1">
+              <a:lnSpc>
+                <a:spcPct val="90000"/>
+              </a:lnSpc>
+              <a:spcBef>
+                <a:spcPct val="0"/>
+              </a:spcBef>
+              <a:buNone/>
+              <a:defRPr sz="6000" kern="1200">
+                <a:solidFill>
+                  <a:schemeClr val="tx1"/>
+                </a:solidFill>
+                <a:latin typeface="+mj-lt"/>
+                <a:ea typeface="+mj-ea"/>
+                <a:cs typeface="+mj-cs"/>
+              </a:defRPr>
+            </a:lvl1pPr>
+          </a:lstStyle>
+          <a:p>
+            <a:r>
+              <a:rPr lang="pl-PL" sz="2800" dirty="0">
+                <a:solidFill>
+                  <a:srgbClr val="000000"/>
+                </a:solidFill>
+              </a:rPr>
+              <a:t>Physical health</a:t>
+            </a:r>
+          </a:p>
+        </p:txBody>
+      </p:sp>
+    </p:spTree>
+    <p:extLst>
+      <p:ext uri="{BB962C8B-B14F-4D97-AF65-F5344CB8AC3E}">
+        <p14:creationId xmlns:p14="http://schemas.microsoft.com/office/powerpoint/2010/main" val="148813252"/>
+      </p:ext>
+    </p:extLst>
+  </p:cSld>
+  <p:clrMapOvr>
+    <a:masterClrMapping/>
+  </p:clrMapOvr>
+</p:sld>
+</file>
+
+<file path=ppt/slides/slide19.xml><?xml version="1.0" encoding="utf-8"?>
+<p:sld xmlns:a="http://schemas.openxmlformats.org/drawingml/2006/main" xmlns:r="http://schemas.openxmlformats.org/officeDocument/2006/relationships" xmlns:p="http://schemas.openxmlformats.org/presentationml/2006/main">
+  <p:cSld>
+    <p:bg>
+      <p:bgPr>
+        <a:solidFill>
+          <a:schemeClr val="bg1"/>
+        </a:solidFill>
+        <a:effectLst/>
+      </p:bgPr>
+    </p:bg>
+    <p:spTree>
+      <p:nvGrpSpPr>
+        <p:cNvPr id="1" name=""/>
+        <p:cNvGrpSpPr/>
+        <p:nvPr/>
+      </p:nvGrpSpPr>
+      <p:grpSpPr>
+        <a:xfrm>
+          <a:off x="0" y="0"/>
+          <a:ext cx="0" cy="0"/>
+          <a:chOff x="0" y="0"/>
+          <a:chExt cx="0" cy="0"/>
+        </a:xfrm>
+      </p:grpSpPr>
+      <p:sp>
+        <p:nvSpPr>
+          <p:cNvPr id="15" name="Rectangle 14">
+            <a:extLst>
+              <a:ext uri="{FF2B5EF4-FFF2-40B4-BE49-F238E27FC236}">
+                <a16:creationId xmlns:a16="http://schemas.microsoft.com/office/drawing/2014/main" id="{86197D16-FE75-4A0E-A0C9-28C0F04A43DF}"/>
+              </a:ext>
+              <a:ext uri="{C183D7F6-B498-43B3-948B-1728B52AA6E4}">
+                <adec:decorative xmlns:adec="http://schemas.microsoft.com/office/drawing/2017/decorative" val="1"/>
+              </a:ext>
+            </a:extLst>
+          </p:cNvPr>
+          <p:cNvSpPr>
+            <a:spLocks noGrp="1" noRot="1" noChangeAspect="1" noMove="1" noResize="1" noEditPoints="1" noAdjustHandles="1" noChangeArrowheads="1" noChangeShapeType="1" noTextEdit="1"/>
+          </p:cNvSpPr>
+          <p:nvPr>
+            <p:extLst>
+              <p:ext uri="{386F3935-93C4-4BCD-93E2-E3B085C9AB24}">
+                <p16:designElem xmlns:p16="http://schemas.microsoft.com/office/powerpoint/2015/main" val="1"/>
+              </p:ext>
+            </p:extLst>
+          </p:nvPr>
+        </p:nvSpPr>
+        <p:spPr>
+          <a:xfrm>
+            <a:off x="0" y="609599"/>
+            <a:ext cx="12192000" cy="6248400"/>
+          </a:xfrm>
+          <a:prstGeom prst="rect">
+            <a:avLst/>
+          </a:prstGeom>
+          <a:gradFill>
+            <a:gsLst>
+              <a:gs pos="0">
+                <a:schemeClr val="accent1">
+                  <a:lumMod val="90000"/>
+                </a:schemeClr>
+              </a:gs>
+              <a:gs pos="25000">
+                <a:schemeClr val="accent1">
+                  <a:lumMod val="90000"/>
+                </a:schemeClr>
+              </a:gs>
+              <a:gs pos="94000">
+                <a:schemeClr val="bg2">
+                  <a:lumMod val="25000"/>
+                </a:schemeClr>
+              </a:gs>
+              <a:gs pos="100000">
+                <a:schemeClr val="bg2">
+                  <a:lumMod val="25000"/>
+                </a:schemeClr>
+              </a:gs>
+            </a:gsLst>
+            <a:lin ang="4200000" scaled="0"/>
+          </a:gradFill>
+          <a:ln>
+            <a:noFill/>
+          </a:ln>
+        </p:spPr>
+        <p:style>
+          <a:lnRef idx="2">
+            <a:schemeClr val="accent1">
+              <a:shade val="50000"/>
+            </a:schemeClr>
+          </a:lnRef>
+          <a:fillRef idx="1">
+            <a:schemeClr val="accent1"/>
+          </a:fillRef>
+          <a:effectRef idx="0">
+            <a:schemeClr val="accent1"/>
+          </a:effectRef>
+          <a:fontRef idx="minor">
+            <a:schemeClr val="lt1"/>
+          </a:fontRef>
+        </p:style>
+        <p:txBody>
+          <a:bodyPr rtlCol="0" anchor="ctr"/>
+          <a:lstStyle/>
+          <a:p>
+            <a:pPr algn="ctr"/>
+            <a:endParaRPr lang="en-US"/>
+          </a:p>
+        </p:txBody>
+      </p:sp>
+      <p:pic>
+        <p:nvPicPr>
+          <p:cNvPr id="17" name="Picture 16">
+            <a:extLst>
+              <a:ext uri="{FF2B5EF4-FFF2-40B4-BE49-F238E27FC236}">
+                <a16:creationId xmlns:a16="http://schemas.microsoft.com/office/drawing/2014/main" id="{FA8FCEC6-4B30-4FF2-8B32-504BEAEA3A16}"/>
+              </a:ext>
+              <a:ext uri="{C183D7F6-B498-43B3-948B-1728B52AA6E4}">
+                <adec:decorative xmlns:adec="http://schemas.microsoft.com/office/drawing/2017/decorative" val="1"/>
+              </a:ext>
+            </a:extLst>
+          </p:cNvPr>
+          <p:cNvPicPr>
+            <a:picLocks noGrp="1" noRot="1" noChangeAspect="1" noMove="1" noResize="1" noEditPoints="1" noAdjustHandles="1" noChangeArrowheads="1" noChangeShapeType="1" noCrop="1"/>
+          </p:cNvPicPr>
+          <p:nvPr>
+            <p:extLst>
+              <p:ext uri="{386F3935-93C4-4BCD-93E2-E3B085C9AB24}">
+                <p16:designElem xmlns:p16="http://schemas.microsoft.com/office/powerpoint/2015/main" val="1"/>
+              </p:ext>
+            </p:extLst>
+          </p:nvPr>
+        </p:nvPicPr>
+        <p:blipFill>
+          <a:blip r:embed="rId2">
+            <a:extLst>
+              <a:ext uri="{28A0092B-C50C-407E-A947-70E740481C1C}">
+                <a14:useLocalDpi xmlns:a14="http://schemas.microsoft.com/office/drawing/2010/main" val="0"/>
+              </a:ext>
+            </a:extLst>
+          </a:blip>
+          <a:srcRect t="45716" b="9820"/>
+          <a:stretch>
+            <a:fillRect/>
+          </a:stretch>
+        </p:blipFill>
+        <p:spPr>
+          <a:xfrm flipV="1">
+            <a:off x="0" y="2374533"/>
+            <a:ext cx="12192000" cy="3049325"/>
+          </a:xfrm>
+          <a:custGeom>
+            <a:avLst/>
+            <a:gdLst>
+              <a:gd name="connsiteX0" fmla="*/ 0 w 12192000"/>
+              <a:gd name="connsiteY0" fmla="*/ 0 h 3049325"/>
+              <a:gd name="connsiteX1" fmla="*/ 12192000 w 12192000"/>
+              <a:gd name="connsiteY1" fmla="*/ 0 h 3049325"/>
+              <a:gd name="connsiteX2" fmla="*/ 12192000 w 12192000"/>
+              <a:gd name="connsiteY2" fmla="*/ 3049325 h 3049325"/>
+              <a:gd name="connsiteX3" fmla="*/ 0 w 12192000"/>
+              <a:gd name="connsiteY3" fmla="*/ 3049325 h 3049325"/>
+            </a:gdLst>
+            <a:ahLst/>
+            <a:cxnLst>
+              <a:cxn ang="0">
+                <a:pos x="connsiteX0" y="connsiteY0"/>
+              </a:cxn>
+              <a:cxn ang="0">
+                <a:pos x="connsiteX1" y="connsiteY1"/>
+              </a:cxn>
+              <a:cxn ang="0">
+                <a:pos x="connsiteX2" y="connsiteY2"/>
+              </a:cxn>
+              <a:cxn ang="0">
+                <a:pos x="connsiteX3" y="connsiteY3"/>
+              </a:cxn>
+            </a:cxnLst>
+            <a:rect l="l" t="t" r="r" b="b"/>
+            <a:pathLst>
+              <a:path w="12192000" h="3049325">
+                <a:moveTo>
+                  <a:pt x="0" y="0"/>
+                </a:moveTo>
+                <a:lnTo>
+                  <a:pt x="12192000" y="0"/>
+                </a:lnTo>
+                <a:lnTo>
+                  <a:pt x="12192000" y="3049325"/>
+                </a:lnTo>
+                <a:lnTo>
+                  <a:pt x="0" y="3049325"/>
+                </a:lnTo>
+                <a:close/>
+              </a:path>
+            </a:pathLst>
+          </a:custGeom>
+        </p:spPr>
+      </p:pic>
+      <p:sp>
+        <p:nvSpPr>
+          <p:cNvPr id="19" name="Rectangle 18">
+            <a:extLst>
+              <a:ext uri="{FF2B5EF4-FFF2-40B4-BE49-F238E27FC236}">
+                <a16:creationId xmlns:a16="http://schemas.microsoft.com/office/drawing/2014/main" id="{92CA431A-BC84-45C3-8430-0459E54A220F}"/>
+              </a:ext>
+              <a:ext uri="{C183D7F6-B498-43B3-948B-1728B52AA6E4}">
+                <adec:decorative xmlns:adec="http://schemas.microsoft.com/office/drawing/2017/decorative" val="1"/>
+              </a:ext>
+            </a:extLst>
+          </p:cNvPr>
+          <p:cNvSpPr>
+            <a:spLocks noGrp="1" noRot="1" noChangeAspect="1" noMove="1" noResize="1" noEditPoints="1" noAdjustHandles="1" noChangeArrowheads="1" noChangeShapeType="1" noTextEdit="1"/>
+          </p:cNvSpPr>
+          <p:nvPr>
+            <p:extLst>
+              <p:ext uri="{386F3935-93C4-4BCD-93E2-E3B085C9AB24}">
+                <p16:designElem xmlns:p16="http://schemas.microsoft.com/office/powerpoint/2015/main" val="1"/>
+              </p:ext>
+            </p:extLst>
+          </p:nvPr>
+        </p:nvSpPr>
+        <p:spPr>
+          <a:xfrm>
+            <a:off x="0" y="0"/>
+            <a:ext cx="12188952" cy="3238500"/>
+          </a:xfrm>
+          <a:prstGeom prst="rect">
+            <a:avLst/>
+          </a:prstGeom>
+          <a:solidFill>
+            <a:srgbClr val="FFFFFF"/>
+          </a:solidFill>
+          <a:ln>
+            <a:noFill/>
+          </a:ln>
+        </p:spPr>
+        <p:style>
+          <a:lnRef idx="2">
+            <a:schemeClr val="accent1">
+              <a:shade val="50000"/>
+            </a:schemeClr>
+          </a:lnRef>
+          <a:fillRef idx="1">
+            <a:schemeClr val="accent1"/>
+          </a:fillRef>
+          <a:effectRef idx="0">
+            <a:schemeClr val="accent1"/>
+          </a:effectRef>
+          <a:fontRef idx="minor">
+            <a:schemeClr val="lt1"/>
+          </a:fontRef>
+        </p:style>
+        <p:txBody>
+          <a:bodyPr rtlCol="0" anchor="ctr"/>
+          <a:lstStyle/>
+          <a:p>
+            <a:pPr algn="ctr"/>
+            <a:endParaRPr lang="en-US"/>
+          </a:p>
+        </p:txBody>
+      </p:sp>
+      <p:sp>
+        <p:nvSpPr>
+          <p:cNvPr id="2" name="Title 1">
+            <a:extLst>
+              <a:ext uri="{FF2B5EF4-FFF2-40B4-BE49-F238E27FC236}">
+                <a16:creationId xmlns:a16="http://schemas.microsoft.com/office/drawing/2014/main" id="{EDBD917A-4D57-447F-8824-5166AB22B210}"/>
+              </a:ext>
+            </a:extLst>
+          </p:cNvPr>
+          <p:cNvSpPr>
+            <a:spLocks noGrp="1"/>
+          </p:cNvSpPr>
+          <p:nvPr>
+            <p:ph type="ctrTitle"/>
+          </p:nvPr>
+        </p:nvSpPr>
+        <p:spPr>
+          <a:xfrm>
+            <a:off x="172050" y="189175"/>
+            <a:ext cx="10021446" cy="657648"/>
+          </a:xfrm>
+        </p:spPr>
+        <p:txBody>
+          <a:bodyPr anchor="ctr">
+            <a:noAutofit/>
+          </a:bodyPr>
+          <a:lstStyle/>
+          <a:p>
+            <a:pPr algn="l"/>
+            <a:r>
+              <a:rPr lang="pl-PL" sz="2800" b="1" dirty="0">
+                <a:solidFill>
+                  <a:srgbClr val="000000"/>
+                </a:solidFill>
+              </a:rPr>
+              <a:t>Fundamental Skills</a:t>
+            </a:r>
+            <a:endParaRPr lang="en-US" sz="2800" b="1" dirty="0">
+              <a:solidFill>
+                <a:srgbClr val="000000"/>
+              </a:solidFill>
+            </a:endParaRPr>
+          </a:p>
+        </p:txBody>
+      </p:sp>
+      <p:sp>
+        <p:nvSpPr>
+          <p:cNvPr id="6" name="Title 1">
+            <a:extLst>
+              <a:ext uri="{FF2B5EF4-FFF2-40B4-BE49-F238E27FC236}">
+                <a16:creationId xmlns:a16="http://schemas.microsoft.com/office/drawing/2014/main" id="{3F421ECC-FD62-4D78-9131-EDE751F80DB6}"/>
+              </a:ext>
+            </a:extLst>
+          </p:cNvPr>
+          <p:cNvSpPr txBox="1">
+            <a:spLocks/>
+          </p:cNvSpPr>
+          <p:nvPr/>
+        </p:nvSpPr>
+        <p:spPr>
+          <a:xfrm>
+            <a:off x="172049" y="961602"/>
+            <a:ext cx="11851337" cy="3049324"/>
+          </a:xfrm>
+          <a:prstGeom prst="rect">
+            <a:avLst/>
+          </a:prstGeom>
+        </p:spPr>
+        <p:txBody>
+          <a:bodyPr vert="horz" lIns="91440" tIns="45720" rIns="91440" bIns="45720" rtlCol="0" anchor="ctr">
+            <a:noAutofit/>
+          </a:bodyPr>
+          <a:lstStyle>
+            <a:lvl1pPr algn="ctr" defTabSz="914400" rtl="0" eaLnBrk="1" latinLnBrk="0" hangingPunct="1">
+              <a:lnSpc>
+                <a:spcPct val="90000"/>
+              </a:lnSpc>
+              <a:spcBef>
+                <a:spcPct val="0"/>
+              </a:spcBef>
+              <a:buNone/>
+              <a:defRPr sz="6000" kern="1200">
+                <a:solidFill>
+                  <a:schemeClr val="tx1"/>
+                </a:solidFill>
+                <a:latin typeface="+mj-lt"/>
+                <a:ea typeface="+mj-ea"/>
+                <a:cs typeface="+mj-cs"/>
+              </a:defRPr>
+            </a:lvl1pPr>
+          </a:lstStyle>
+          <a:p>
+            <a:r>
+              <a:rPr lang="en-US" sz="2800" dirty="0">
+                <a:solidFill>
+                  <a:srgbClr val="000000"/>
+                </a:solidFill>
+              </a:rPr>
+              <a:t>Mental health</a:t>
+            </a:r>
+          </a:p>
+        </p:txBody>
+      </p:sp>
+    </p:spTree>
+    <p:extLst>
+      <p:ext uri="{BB962C8B-B14F-4D97-AF65-F5344CB8AC3E}">
+        <p14:creationId xmlns:p14="http://schemas.microsoft.com/office/powerpoint/2010/main" val="1381626495"/>
+      </p:ext>
+    </p:extLst>
+  </p:cSld>
+  <p:clrMapOvr>
+    <a:masterClrMapping/>
+  </p:clrMapOvr>
+</p:sld>
+</file>
+
+<file path=ppt/slides/slide2.xml><?xml version="1.0" encoding="utf-8"?>
+<p:sld xmlns:a="http://schemas.openxmlformats.org/drawingml/2006/main" xmlns:r="http://schemas.openxmlformats.org/officeDocument/2006/relationships" xmlns:p="http://schemas.openxmlformats.org/presentationml/2006/main">
+  <p:cSld>
+    <p:bg>
+      <p:bgPr>
+        <a:solidFill>
+          <a:schemeClr val="bg1"/>
+        </a:solidFill>
+        <a:effectLst/>
+      </p:bgPr>
+    </p:bg>
+    <p:spTree>
+      <p:nvGrpSpPr>
+        <p:cNvPr id="1" name=""/>
+        <p:cNvGrpSpPr/>
+        <p:nvPr/>
+      </p:nvGrpSpPr>
+      <p:grpSpPr>
+        <a:xfrm>
+          <a:off x="0" y="0"/>
+          <a:ext cx="0" cy="0"/>
+          <a:chOff x="0" y="0"/>
+          <a:chExt cx="0" cy="0"/>
+        </a:xfrm>
+      </p:grpSpPr>
+      <p:sp>
+        <p:nvSpPr>
+          <p:cNvPr id="15" name="Rectangle 14">
+            <a:extLst>
+              <a:ext uri="{FF2B5EF4-FFF2-40B4-BE49-F238E27FC236}">
+                <a16:creationId xmlns:a16="http://schemas.microsoft.com/office/drawing/2014/main" id="{86197D16-FE75-4A0E-A0C9-28C0F04A43DF}"/>
+              </a:ext>
+              <a:ext uri="{C183D7F6-B498-43B3-948B-1728B52AA6E4}">
+                <adec:decorative xmlns:adec="http://schemas.microsoft.com/office/drawing/2017/decorative" val="1"/>
+              </a:ext>
+            </a:extLst>
+          </p:cNvPr>
+          <p:cNvSpPr>
+            <a:spLocks noGrp="1" noRot="1" noChangeAspect="1" noMove="1" noResize="1" noEditPoints="1" noAdjustHandles="1" noChangeArrowheads="1" noChangeShapeType="1" noTextEdit="1"/>
+          </p:cNvSpPr>
+          <p:nvPr>
+            <p:extLst>
+              <p:ext uri="{386F3935-93C4-4BCD-93E2-E3B085C9AB24}">
+                <p16:designElem xmlns:p16="http://schemas.microsoft.com/office/powerpoint/2015/main" val="1"/>
+              </p:ext>
+            </p:extLst>
+          </p:nvPr>
+        </p:nvSpPr>
+        <p:spPr>
+          <a:xfrm>
+            <a:off x="0" y="609599"/>
+            <a:ext cx="12192000" cy="6248400"/>
+          </a:xfrm>
+          <a:prstGeom prst="rect">
+            <a:avLst/>
+          </a:prstGeom>
+          <a:gradFill>
+            <a:gsLst>
+              <a:gs pos="0">
+                <a:schemeClr val="accent1">
+                  <a:lumMod val="90000"/>
+                </a:schemeClr>
+              </a:gs>
+              <a:gs pos="25000">
+                <a:schemeClr val="accent1">
+                  <a:lumMod val="90000"/>
+                </a:schemeClr>
+              </a:gs>
+              <a:gs pos="94000">
+                <a:schemeClr val="bg2">
+                  <a:lumMod val="25000"/>
+                </a:schemeClr>
+              </a:gs>
+              <a:gs pos="100000">
+                <a:schemeClr val="bg2">
+                  <a:lumMod val="25000"/>
+                </a:schemeClr>
+              </a:gs>
+            </a:gsLst>
+            <a:lin ang="4200000" scaled="0"/>
+          </a:gradFill>
+          <a:ln>
+            <a:noFill/>
+          </a:ln>
+        </p:spPr>
+        <p:style>
+          <a:lnRef idx="2">
+            <a:schemeClr val="accent1">
+              <a:shade val="50000"/>
+            </a:schemeClr>
+          </a:lnRef>
+          <a:fillRef idx="1">
+            <a:schemeClr val="accent1"/>
+          </a:fillRef>
+          <a:effectRef idx="0">
+            <a:schemeClr val="accent1"/>
+          </a:effectRef>
+          <a:fontRef idx="minor">
+            <a:schemeClr val="lt1"/>
+          </a:fontRef>
+        </p:style>
+        <p:txBody>
+          <a:bodyPr rtlCol="0" anchor="ctr"/>
+          <a:lstStyle/>
+          <a:p>
+            <a:pPr algn="ctr"/>
+            <a:endParaRPr lang="en-US"/>
+          </a:p>
+        </p:txBody>
+      </p:sp>
+      <p:pic>
+        <p:nvPicPr>
+          <p:cNvPr id="17" name="Picture 16">
+            <a:extLst>
+              <a:ext uri="{FF2B5EF4-FFF2-40B4-BE49-F238E27FC236}">
+                <a16:creationId xmlns:a16="http://schemas.microsoft.com/office/drawing/2014/main" id="{FA8FCEC6-4B30-4FF2-8B32-504BEAEA3A16}"/>
+              </a:ext>
+              <a:ext uri="{C183D7F6-B498-43B3-948B-1728B52AA6E4}">
+                <adec:decorative xmlns:adec="http://schemas.microsoft.com/office/drawing/2017/decorative" val="1"/>
+              </a:ext>
+            </a:extLst>
+          </p:cNvPr>
+          <p:cNvPicPr>
+            <a:picLocks noGrp="1" noRot="1" noChangeAspect="1" noMove="1" noResize="1" noEditPoints="1" noAdjustHandles="1" noChangeArrowheads="1" noChangeShapeType="1" noCrop="1"/>
+          </p:cNvPicPr>
+          <p:nvPr>
+            <p:extLst>
+              <p:ext uri="{386F3935-93C4-4BCD-93E2-E3B085C9AB24}">
+                <p16:designElem xmlns:p16="http://schemas.microsoft.com/office/powerpoint/2015/main" val="1"/>
+              </p:ext>
+            </p:extLst>
+          </p:nvPr>
+        </p:nvPicPr>
+        <p:blipFill>
+          <a:blip r:embed="rId2">
+            <a:extLst>
+              <a:ext uri="{28A0092B-C50C-407E-A947-70E740481C1C}">
+                <a14:useLocalDpi xmlns:a14="http://schemas.microsoft.com/office/drawing/2010/main" val="0"/>
+              </a:ext>
+            </a:extLst>
+          </a:blip>
+          <a:srcRect t="45716" b="9820"/>
+          <a:stretch>
+            <a:fillRect/>
+          </a:stretch>
+        </p:blipFill>
+        <p:spPr>
+          <a:xfrm flipV="1">
+            <a:off x="0" y="2374533"/>
+            <a:ext cx="12192000" cy="3049325"/>
+          </a:xfrm>
+          <a:custGeom>
+            <a:avLst/>
+            <a:gdLst>
+              <a:gd name="connsiteX0" fmla="*/ 0 w 12192000"/>
+              <a:gd name="connsiteY0" fmla="*/ 0 h 3049325"/>
+              <a:gd name="connsiteX1" fmla="*/ 12192000 w 12192000"/>
+              <a:gd name="connsiteY1" fmla="*/ 0 h 3049325"/>
+              <a:gd name="connsiteX2" fmla="*/ 12192000 w 12192000"/>
+              <a:gd name="connsiteY2" fmla="*/ 3049325 h 3049325"/>
+              <a:gd name="connsiteX3" fmla="*/ 0 w 12192000"/>
+              <a:gd name="connsiteY3" fmla="*/ 3049325 h 3049325"/>
+            </a:gdLst>
+            <a:ahLst/>
+            <a:cxnLst>
+              <a:cxn ang="0">
+                <a:pos x="connsiteX0" y="connsiteY0"/>
+              </a:cxn>
+              <a:cxn ang="0">
+                <a:pos x="connsiteX1" y="connsiteY1"/>
+              </a:cxn>
+              <a:cxn ang="0">
+                <a:pos x="connsiteX2" y="connsiteY2"/>
+              </a:cxn>
+              <a:cxn ang="0">
+                <a:pos x="connsiteX3" y="connsiteY3"/>
+              </a:cxn>
+            </a:cxnLst>
+            <a:rect l="l" t="t" r="r" b="b"/>
+            <a:pathLst>
+              <a:path w="12192000" h="3049325">
+                <a:moveTo>
+                  <a:pt x="0" y="0"/>
+                </a:moveTo>
+                <a:lnTo>
+                  <a:pt x="12192000" y="0"/>
+                </a:lnTo>
+                <a:lnTo>
+                  <a:pt x="12192000" y="3049325"/>
+                </a:lnTo>
+                <a:lnTo>
+                  <a:pt x="0" y="3049325"/>
+                </a:lnTo>
+                <a:close/>
+              </a:path>
+            </a:pathLst>
+          </a:custGeom>
+        </p:spPr>
+      </p:pic>
+      <p:sp>
+        <p:nvSpPr>
+          <p:cNvPr id="19" name="Rectangle 18">
+            <a:extLst>
+              <a:ext uri="{FF2B5EF4-FFF2-40B4-BE49-F238E27FC236}">
+                <a16:creationId xmlns:a16="http://schemas.microsoft.com/office/drawing/2014/main" id="{92CA431A-BC84-45C3-8430-0459E54A220F}"/>
+              </a:ext>
+              <a:ext uri="{C183D7F6-B498-43B3-948B-1728B52AA6E4}">
+                <adec:decorative xmlns:adec="http://schemas.microsoft.com/office/drawing/2017/decorative" val="1"/>
+              </a:ext>
+            </a:extLst>
+          </p:cNvPr>
+          <p:cNvSpPr>
+            <a:spLocks noGrp="1" noRot="1" noChangeAspect="1" noMove="1" noResize="1" noEditPoints="1" noAdjustHandles="1" noChangeArrowheads="1" noChangeShapeType="1" noTextEdit="1"/>
+          </p:cNvSpPr>
+          <p:nvPr>
+            <p:extLst>
+              <p:ext uri="{386F3935-93C4-4BCD-93E2-E3B085C9AB24}">
+                <p16:designElem xmlns:p16="http://schemas.microsoft.com/office/powerpoint/2015/main" val="1"/>
+              </p:ext>
+            </p:extLst>
+          </p:nvPr>
+        </p:nvSpPr>
+        <p:spPr>
+          <a:xfrm>
+            <a:off x="0" y="0"/>
+            <a:ext cx="12188952" cy="3238500"/>
+          </a:xfrm>
+          <a:prstGeom prst="rect">
+            <a:avLst/>
+          </a:prstGeom>
+          <a:solidFill>
+            <a:srgbClr val="FFFFFF"/>
+          </a:solidFill>
+          <a:ln>
+            <a:noFill/>
+          </a:ln>
+        </p:spPr>
+        <p:style>
+          <a:lnRef idx="2">
+            <a:schemeClr val="accent1">
+              <a:shade val="50000"/>
+            </a:schemeClr>
+          </a:lnRef>
+          <a:fillRef idx="1">
+            <a:schemeClr val="accent1"/>
+          </a:fillRef>
+          <a:effectRef idx="0">
+            <a:schemeClr val="accent1"/>
+          </a:effectRef>
+          <a:fontRef idx="minor">
+            <a:schemeClr val="lt1"/>
+          </a:fontRef>
+        </p:style>
+        <p:txBody>
+          <a:bodyPr rtlCol="0" anchor="ctr"/>
+          <a:lstStyle/>
+          <a:p>
+            <a:pPr algn="ctr"/>
+            <a:endParaRPr lang="en-US"/>
+          </a:p>
+        </p:txBody>
+      </p:sp>
+      <p:sp>
+        <p:nvSpPr>
+          <p:cNvPr id="2" name="Title 1">
+            <a:extLst>
+              <a:ext uri="{FF2B5EF4-FFF2-40B4-BE49-F238E27FC236}">
+                <a16:creationId xmlns:a16="http://schemas.microsoft.com/office/drawing/2014/main" id="{EDBD917A-4D57-447F-8824-5166AB22B210}"/>
+              </a:ext>
+            </a:extLst>
+          </p:cNvPr>
+          <p:cNvSpPr>
+            <a:spLocks noGrp="1"/>
+          </p:cNvSpPr>
+          <p:nvPr>
+            <p:ph type="ctrTitle"/>
+          </p:nvPr>
+        </p:nvSpPr>
+        <p:spPr>
+          <a:xfrm>
+            <a:off x="804484" y="940391"/>
+            <a:ext cx="10021446" cy="2944457"/>
+          </a:xfrm>
+        </p:spPr>
+        <p:txBody>
+          <a:bodyPr anchor="ctr">
+            <a:normAutofit/>
+          </a:bodyPr>
+          <a:lstStyle/>
+          <a:p>
+            <a:pPr algn="l"/>
+            <a:r>
+              <a:rPr lang="pl-PL" sz="6600" dirty="0">
+                <a:solidFill>
+                  <a:srgbClr val="000000"/>
+                </a:solidFill>
+              </a:rPr>
+              <a:t>What is it</a:t>
+            </a:r>
+            <a:r>
+              <a:rPr lang="en-US" sz="6600" dirty="0">
+                <a:solidFill>
+                  <a:srgbClr val="000000"/>
+                </a:solidFill>
+              </a:rPr>
+              <a:t>?</a:t>
+            </a:r>
+          </a:p>
+        </p:txBody>
+      </p:sp>
+    </p:spTree>
+    <p:extLst>
+      <p:ext uri="{BB962C8B-B14F-4D97-AF65-F5344CB8AC3E}">
+        <p14:creationId xmlns:p14="http://schemas.microsoft.com/office/powerpoint/2010/main" val="2510152813"/>
+      </p:ext>
+    </p:extLst>
+  </p:cSld>
+  <p:clrMapOvr>
+    <a:masterClrMapping/>
+  </p:clrMapOvr>
+</p:sld>
+</file>
+
+<file path=ppt/slides/slide3.xml><?xml version="1.0" encoding="utf-8"?>
+<p:sld xmlns:a="http://schemas.openxmlformats.org/drawingml/2006/main" xmlns:r="http://schemas.openxmlformats.org/officeDocument/2006/relationships" xmlns:p="http://schemas.openxmlformats.org/presentationml/2006/main">
+  <p:cSld>
+    <p:bg>
+      <p:bgPr>
+        <a:solidFill>
+          <a:schemeClr val="bg1"/>
+        </a:solidFill>
+        <a:effectLst/>
+      </p:bgPr>
+    </p:bg>
+    <p:spTree>
+      <p:nvGrpSpPr>
+        <p:cNvPr id="1" name=""/>
+        <p:cNvGrpSpPr/>
+        <p:nvPr/>
+      </p:nvGrpSpPr>
+      <p:grpSpPr>
+        <a:xfrm>
+          <a:off x="0" y="0"/>
+          <a:ext cx="0" cy="0"/>
+          <a:chOff x="0" y="0"/>
+          <a:chExt cx="0" cy="0"/>
+        </a:xfrm>
+      </p:grpSpPr>
+      <p:sp>
+        <p:nvSpPr>
+          <p:cNvPr id="15" name="Rectangle 14">
+            <a:extLst>
+              <a:ext uri="{FF2B5EF4-FFF2-40B4-BE49-F238E27FC236}">
+                <a16:creationId xmlns:a16="http://schemas.microsoft.com/office/drawing/2014/main" id="{86197D16-FE75-4A0E-A0C9-28C0F04A43DF}"/>
+              </a:ext>
+              <a:ext uri="{C183D7F6-B498-43B3-948B-1728B52AA6E4}">
+                <adec:decorative xmlns:adec="http://schemas.microsoft.com/office/drawing/2017/decorative" val="1"/>
+              </a:ext>
+            </a:extLst>
+          </p:cNvPr>
+          <p:cNvSpPr>
+            <a:spLocks noGrp="1" noRot="1" noChangeAspect="1" noMove="1" noResize="1" noEditPoints="1" noAdjustHandles="1" noChangeArrowheads="1" noChangeShapeType="1" noTextEdit="1"/>
+          </p:cNvSpPr>
+          <p:nvPr>
+            <p:extLst>
+              <p:ext uri="{386F3935-93C4-4BCD-93E2-E3B085C9AB24}">
+                <p16:designElem xmlns:p16="http://schemas.microsoft.com/office/powerpoint/2015/main" val="1"/>
+              </p:ext>
+            </p:extLst>
+          </p:nvPr>
+        </p:nvSpPr>
+        <p:spPr>
+          <a:xfrm>
+            <a:off x="0" y="609599"/>
+            <a:ext cx="12192000" cy="6248400"/>
+          </a:xfrm>
+          <a:prstGeom prst="rect">
+            <a:avLst/>
+          </a:prstGeom>
+          <a:gradFill>
+            <a:gsLst>
+              <a:gs pos="0">
+                <a:schemeClr val="accent1">
+                  <a:lumMod val="90000"/>
+                </a:schemeClr>
+              </a:gs>
+              <a:gs pos="25000">
+                <a:schemeClr val="accent1">
+                  <a:lumMod val="90000"/>
+                </a:schemeClr>
+              </a:gs>
+              <a:gs pos="94000">
+                <a:schemeClr val="bg2">
+                  <a:lumMod val="25000"/>
+                </a:schemeClr>
+              </a:gs>
+              <a:gs pos="100000">
+                <a:schemeClr val="bg2">
+                  <a:lumMod val="25000"/>
+                </a:schemeClr>
+              </a:gs>
+            </a:gsLst>
+            <a:lin ang="4200000" scaled="0"/>
+          </a:gradFill>
+          <a:ln>
+            <a:noFill/>
+          </a:ln>
+        </p:spPr>
+        <p:style>
+          <a:lnRef idx="2">
+            <a:schemeClr val="accent1">
+              <a:shade val="50000"/>
+            </a:schemeClr>
+          </a:lnRef>
+          <a:fillRef idx="1">
+            <a:schemeClr val="accent1"/>
+          </a:fillRef>
+          <a:effectRef idx="0">
+            <a:schemeClr val="accent1"/>
+          </a:effectRef>
+          <a:fontRef idx="minor">
+            <a:schemeClr val="lt1"/>
+          </a:fontRef>
+        </p:style>
+        <p:txBody>
+          <a:bodyPr rtlCol="0" anchor="ctr"/>
+          <a:lstStyle/>
+          <a:p>
+            <a:pPr algn="ctr"/>
+            <a:endParaRPr lang="en-US"/>
+          </a:p>
+        </p:txBody>
+      </p:sp>
+      <p:pic>
+        <p:nvPicPr>
+          <p:cNvPr id="17" name="Picture 16">
+            <a:extLst>
+              <a:ext uri="{FF2B5EF4-FFF2-40B4-BE49-F238E27FC236}">
+                <a16:creationId xmlns:a16="http://schemas.microsoft.com/office/drawing/2014/main" id="{FA8FCEC6-4B30-4FF2-8B32-504BEAEA3A16}"/>
+              </a:ext>
+              <a:ext uri="{C183D7F6-B498-43B3-948B-1728B52AA6E4}">
+                <adec:decorative xmlns:adec="http://schemas.microsoft.com/office/drawing/2017/decorative" val="1"/>
+              </a:ext>
+            </a:extLst>
+          </p:cNvPr>
+          <p:cNvPicPr>
+            <a:picLocks noGrp="1" noRot="1" noChangeAspect="1" noMove="1" noResize="1" noEditPoints="1" noAdjustHandles="1" noChangeArrowheads="1" noChangeShapeType="1" noCrop="1"/>
+          </p:cNvPicPr>
+          <p:nvPr>
+            <p:extLst>
+              <p:ext uri="{386F3935-93C4-4BCD-93E2-E3B085C9AB24}">
+                <p16:designElem xmlns:p16="http://schemas.microsoft.com/office/powerpoint/2015/main" val="1"/>
+              </p:ext>
+            </p:extLst>
+          </p:nvPr>
+        </p:nvPicPr>
+        <p:blipFill>
+          <a:blip r:embed="rId2">
+            <a:extLst>
+              <a:ext uri="{28A0092B-C50C-407E-A947-70E740481C1C}">
+                <a14:useLocalDpi xmlns:a14="http://schemas.microsoft.com/office/drawing/2010/main" val="0"/>
+              </a:ext>
+            </a:extLst>
+          </a:blip>
+          <a:srcRect t="45716" b="9820"/>
+          <a:stretch>
+            <a:fillRect/>
+          </a:stretch>
+        </p:blipFill>
+        <p:spPr>
+          <a:xfrm flipV="1">
+            <a:off x="0" y="2374533"/>
+            <a:ext cx="12192000" cy="3049325"/>
+          </a:xfrm>
+          <a:custGeom>
+            <a:avLst/>
+            <a:gdLst>
+              <a:gd name="connsiteX0" fmla="*/ 0 w 12192000"/>
+              <a:gd name="connsiteY0" fmla="*/ 0 h 3049325"/>
+              <a:gd name="connsiteX1" fmla="*/ 12192000 w 12192000"/>
+              <a:gd name="connsiteY1" fmla="*/ 0 h 3049325"/>
+              <a:gd name="connsiteX2" fmla="*/ 12192000 w 12192000"/>
+              <a:gd name="connsiteY2" fmla="*/ 3049325 h 3049325"/>
+              <a:gd name="connsiteX3" fmla="*/ 0 w 12192000"/>
+              <a:gd name="connsiteY3" fmla="*/ 3049325 h 3049325"/>
+            </a:gdLst>
+            <a:ahLst/>
+            <a:cxnLst>
+              <a:cxn ang="0">
+                <a:pos x="connsiteX0" y="connsiteY0"/>
+              </a:cxn>
+              <a:cxn ang="0">
+                <a:pos x="connsiteX1" y="connsiteY1"/>
+              </a:cxn>
+              <a:cxn ang="0">
+                <a:pos x="connsiteX2" y="connsiteY2"/>
+              </a:cxn>
+              <a:cxn ang="0">
+                <a:pos x="connsiteX3" y="connsiteY3"/>
+              </a:cxn>
+            </a:cxnLst>
+            <a:rect l="l" t="t" r="r" b="b"/>
+            <a:pathLst>
+              <a:path w="12192000" h="3049325">
+                <a:moveTo>
+                  <a:pt x="0" y="0"/>
+                </a:moveTo>
+                <a:lnTo>
+                  <a:pt x="12192000" y="0"/>
+                </a:lnTo>
+                <a:lnTo>
+                  <a:pt x="12192000" y="3049325"/>
+                </a:lnTo>
+                <a:lnTo>
+                  <a:pt x="0" y="3049325"/>
+                </a:lnTo>
+                <a:close/>
+              </a:path>
+            </a:pathLst>
+          </a:custGeom>
+        </p:spPr>
+      </p:pic>
+      <p:sp>
+        <p:nvSpPr>
+          <p:cNvPr id="19" name="Rectangle 18">
+            <a:extLst>
+              <a:ext uri="{FF2B5EF4-FFF2-40B4-BE49-F238E27FC236}">
+                <a16:creationId xmlns:a16="http://schemas.microsoft.com/office/drawing/2014/main" id="{92CA431A-BC84-45C3-8430-0459E54A220F}"/>
+              </a:ext>
+              <a:ext uri="{C183D7F6-B498-43B3-948B-1728B52AA6E4}">
+                <adec:decorative xmlns:adec="http://schemas.microsoft.com/office/drawing/2017/decorative" val="1"/>
+              </a:ext>
+            </a:extLst>
+          </p:cNvPr>
+          <p:cNvSpPr>
+            <a:spLocks noGrp="1" noRot="1" noChangeAspect="1" noMove="1" noResize="1" noEditPoints="1" noAdjustHandles="1" noChangeArrowheads="1" noChangeShapeType="1" noTextEdit="1"/>
+          </p:cNvSpPr>
+          <p:nvPr>
+            <p:extLst>
+              <p:ext uri="{386F3935-93C4-4BCD-93E2-E3B085C9AB24}">
+                <p16:designElem xmlns:p16="http://schemas.microsoft.com/office/powerpoint/2015/main" val="1"/>
+              </p:ext>
+            </p:extLst>
+          </p:nvPr>
+        </p:nvSpPr>
+        <p:spPr>
+          <a:xfrm>
+            <a:off x="0" y="0"/>
+            <a:ext cx="12188952" cy="3238500"/>
+          </a:xfrm>
+          <a:prstGeom prst="rect">
+            <a:avLst/>
+          </a:prstGeom>
+          <a:solidFill>
+            <a:srgbClr val="FFFFFF"/>
+          </a:solidFill>
+          <a:ln>
+            <a:noFill/>
+          </a:ln>
+        </p:spPr>
+        <p:style>
+          <a:lnRef idx="2">
+            <a:schemeClr val="accent1">
+              <a:shade val="50000"/>
+            </a:schemeClr>
+          </a:lnRef>
+          <a:fillRef idx="1">
+            <a:schemeClr val="accent1"/>
+          </a:fillRef>
+          <a:effectRef idx="0">
+            <a:schemeClr val="accent1"/>
+          </a:effectRef>
+          <a:fontRef idx="minor">
+            <a:schemeClr val="lt1"/>
+          </a:fontRef>
+        </p:style>
+        <p:txBody>
+          <a:bodyPr rtlCol="0" anchor="ctr"/>
+          <a:lstStyle/>
+          <a:p>
+            <a:pPr algn="ctr"/>
+            <a:endParaRPr lang="en-US"/>
+          </a:p>
+        </p:txBody>
+      </p:sp>
+      <p:sp>
+        <p:nvSpPr>
+          <p:cNvPr id="2" name="Title 1">
+            <a:extLst>
+              <a:ext uri="{FF2B5EF4-FFF2-40B4-BE49-F238E27FC236}">
+                <a16:creationId xmlns:a16="http://schemas.microsoft.com/office/drawing/2014/main" id="{EDBD917A-4D57-447F-8824-5166AB22B210}"/>
+              </a:ext>
+            </a:extLst>
+          </p:cNvPr>
+          <p:cNvSpPr>
+            <a:spLocks noGrp="1"/>
+          </p:cNvSpPr>
+          <p:nvPr>
+            <p:ph type="ctrTitle"/>
+          </p:nvPr>
+        </p:nvSpPr>
+        <p:spPr>
+          <a:xfrm>
+            <a:off x="804484" y="940391"/>
+            <a:ext cx="10021446" cy="2944457"/>
+          </a:xfrm>
+        </p:spPr>
+        <p:txBody>
+          <a:bodyPr anchor="ctr">
+            <a:normAutofit/>
+          </a:bodyPr>
+          <a:lstStyle/>
+          <a:p>
+            <a:pPr algn="l"/>
+            <a:r>
+              <a:rPr lang="pl-PL" sz="6600" dirty="0">
+                <a:solidFill>
+                  <a:srgbClr val="000000"/>
+                </a:solidFill>
+              </a:rPr>
+              <a:t>The problem</a:t>
+            </a:r>
+            <a:endParaRPr lang="en-US" sz="6600" dirty="0">
+              <a:solidFill>
+                <a:srgbClr val="000000"/>
+              </a:solidFill>
+            </a:endParaRPr>
+          </a:p>
+        </p:txBody>
+      </p:sp>
+    </p:spTree>
+    <p:extLst>
+      <p:ext uri="{BB962C8B-B14F-4D97-AF65-F5344CB8AC3E}">
+        <p14:creationId xmlns:p14="http://schemas.microsoft.com/office/powerpoint/2010/main" val="2412873040"/>
+      </p:ext>
+    </p:extLst>
+  </p:cSld>
+  <p:clrMapOvr>
+    <a:masterClrMapping/>
+  </p:clrMapOvr>
+</p:sld>
+</file>
+
+<file path=ppt/slides/slide4.xml><?xml version="1.0" encoding="utf-8"?>
+<p:sld xmlns:a="http://schemas.openxmlformats.org/drawingml/2006/main" xmlns:r="http://schemas.openxmlformats.org/officeDocument/2006/relationships" xmlns:p="http://schemas.openxmlformats.org/presentationml/2006/main">
+  <p:cSld>
+    <p:bg>
+      <p:bgPr>
+        <a:solidFill>
+          <a:schemeClr val="bg1"/>
+        </a:solidFill>
+        <a:effectLst/>
+      </p:bgPr>
+    </p:bg>
+    <p:spTree>
+      <p:nvGrpSpPr>
+        <p:cNvPr id="1" name=""/>
+        <p:cNvGrpSpPr/>
+        <p:nvPr/>
+      </p:nvGrpSpPr>
+      <p:grpSpPr>
+        <a:xfrm>
+          <a:off x="0" y="0"/>
+          <a:ext cx="0" cy="0"/>
+          <a:chOff x="0" y="0"/>
+          <a:chExt cx="0" cy="0"/>
+        </a:xfrm>
+      </p:grpSpPr>
+      <p:sp>
+        <p:nvSpPr>
+          <p:cNvPr id="15" name="Rectangle 14">
+            <a:extLst>
+              <a:ext uri="{FF2B5EF4-FFF2-40B4-BE49-F238E27FC236}">
+                <a16:creationId xmlns:a16="http://schemas.microsoft.com/office/drawing/2014/main" id="{86197D16-FE75-4A0E-A0C9-28C0F04A43DF}"/>
+              </a:ext>
+              <a:ext uri="{C183D7F6-B498-43B3-948B-1728B52AA6E4}">
+                <adec:decorative xmlns:adec="http://schemas.microsoft.com/office/drawing/2017/decorative" val="1"/>
+              </a:ext>
+            </a:extLst>
+          </p:cNvPr>
+          <p:cNvSpPr>
+            <a:spLocks noGrp="1" noRot="1" noChangeAspect="1" noMove="1" noResize="1" noEditPoints="1" noAdjustHandles="1" noChangeArrowheads="1" noChangeShapeType="1" noTextEdit="1"/>
+          </p:cNvSpPr>
+          <p:nvPr>
+            <p:extLst>
+              <p:ext uri="{386F3935-93C4-4BCD-93E2-E3B085C9AB24}">
+                <p16:designElem xmlns:p16="http://schemas.microsoft.com/office/powerpoint/2015/main" val="1"/>
+              </p:ext>
+            </p:extLst>
+          </p:nvPr>
+        </p:nvSpPr>
+        <p:spPr>
+          <a:xfrm>
+            <a:off x="0" y="609599"/>
+            <a:ext cx="12192000" cy="6248400"/>
+          </a:xfrm>
+          <a:prstGeom prst="rect">
+            <a:avLst/>
+          </a:prstGeom>
+          <a:gradFill>
+            <a:gsLst>
+              <a:gs pos="0">
+                <a:schemeClr val="accent1">
+                  <a:lumMod val="90000"/>
+                </a:schemeClr>
+              </a:gs>
+              <a:gs pos="25000">
+                <a:schemeClr val="accent1">
+                  <a:lumMod val="90000"/>
+                </a:schemeClr>
+              </a:gs>
+              <a:gs pos="94000">
+                <a:schemeClr val="bg2">
+                  <a:lumMod val="25000"/>
+                </a:schemeClr>
+              </a:gs>
+              <a:gs pos="100000">
+                <a:schemeClr val="bg2">
+                  <a:lumMod val="25000"/>
+                </a:schemeClr>
+              </a:gs>
+            </a:gsLst>
+            <a:lin ang="4200000" scaled="0"/>
+          </a:gradFill>
+          <a:ln>
+            <a:noFill/>
+          </a:ln>
+        </p:spPr>
+        <p:style>
+          <a:lnRef idx="2">
+            <a:schemeClr val="accent1">
+              <a:shade val="50000"/>
+            </a:schemeClr>
+          </a:lnRef>
+          <a:fillRef idx="1">
+            <a:schemeClr val="accent1"/>
+          </a:fillRef>
+          <a:effectRef idx="0">
+            <a:schemeClr val="accent1"/>
+          </a:effectRef>
+          <a:fontRef idx="minor">
+            <a:schemeClr val="lt1"/>
+          </a:fontRef>
+        </p:style>
+        <p:txBody>
+          <a:bodyPr rtlCol="0" anchor="ctr"/>
+          <a:lstStyle/>
+          <a:p>
+            <a:pPr algn="ctr"/>
+            <a:endParaRPr lang="en-US"/>
+          </a:p>
+        </p:txBody>
+      </p:sp>
+      <p:pic>
+        <p:nvPicPr>
+          <p:cNvPr id="17" name="Picture 16">
+            <a:extLst>
+              <a:ext uri="{FF2B5EF4-FFF2-40B4-BE49-F238E27FC236}">
+                <a16:creationId xmlns:a16="http://schemas.microsoft.com/office/drawing/2014/main" id="{FA8FCEC6-4B30-4FF2-8B32-504BEAEA3A16}"/>
+              </a:ext>
+              <a:ext uri="{C183D7F6-B498-43B3-948B-1728B52AA6E4}">
+                <adec:decorative xmlns:adec="http://schemas.microsoft.com/office/drawing/2017/decorative" val="1"/>
+              </a:ext>
+            </a:extLst>
+          </p:cNvPr>
+          <p:cNvPicPr>
+            <a:picLocks noGrp="1" noRot="1" noChangeAspect="1" noMove="1" noResize="1" noEditPoints="1" noAdjustHandles="1" noChangeArrowheads="1" noChangeShapeType="1" noCrop="1"/>
+          </p:cNvPicPr>
+          <p:nvPr>
+            <p:extLst>
+              <p:ext uri="{386F3935-93C4-4BCD-93E2-E3B085C9AB24}">
+                <p16:designElem xmlns:p16="http://schemas.microsoft.com/office/powerpoint/2015/main" val="1"/>
+              </p:ext>
+            </p:extLst>
+          </p:nvPr>
+        </p:nvPicPr>
+        <p:blipFill>
+          <a:blip r:embed="rId2">
+            <a:extLst>
+              <a:ext uri="{28A0092B-C50C-407E-A947-70E740481C1C}">
+                <a14:useLocalDpi xmlns:a14="http://schemas.microsoft.com/office/drawing/2010/main" val="0"/>
+              </a:ext>
+            </a:extLst>
+          </a:blip>
+          <a:srcRect t="45716" b="9820"/>
+          <a:stretch>
+            <a:fillRect/>
+          </a:stretch>
+        </p:blipFill>
+        <p:spPr>
+          <a:xfrm flipV="1">
+            <a:off x="0" y="2374533"/>
+            <a:ext cx="12192000" cy="3049325"/>
+          </a:xfrm>
+          <a:custGeom>
+            <a:avLst/>
+            <a:gdLst>
+              <a:gd name="connsiteX0" fmla="*/ 0 w 12192000"/>
+              <a:gd name="connsiteY0" fmla="*/ 0 h 3049325"/>
+              <a:gd name="connsiteX1" fmla="*/ 12192000 w 12192000"/>
+              <a:gd name="connsiteY1" fmla="*/ 0 h 3049325"/>
+              <a:gd name="connsiteX2" fmla="*/ 12192000 w 12192000"/>
+              <a:gd name="connsiteY2" fmla="*/ 3049325 h 3049325"/>
+              <a:gd name="connsiteX3" fmla="*/ 0 w 12192000"/>
+              <a:gd name="connsiteY3" fmla="*/ 3049325 h 3049325"/>
+            </a:gdLst>
+            <a:ahLst/>
+            <a:cxnLst>
+              <a:cxn ang="0">
+                <a:pos x="connsiteX0" y="connsiteY0"/>
+              </a:cxn>
+              <a:cxn ang="0">
+                <a:pos x="connsiteX1" y="connsiteY1"/>
+              </a:cxn>
+              <a:cxn ang="0">
+                <a:pos x="connsiteX2" y="connsiteY2"/>
+              </a:cxn>
+              <a:cxn ang="0">
+                <a:pos x="connsiteX3" y="connsiteY3"/>
+              </a:cxn>
+            </a:cxnLst>
+            <a:rect l="l" t="t" r="r" b="b"/>
+            <a:pathLst>
+              <a:path w="12192000" h="3049325">
+                <a:moveTo>
+                  <a:pt x="0" y="0"/>
+                </a:moveTo>
+                <a:lnTo>
+                  <a:pt x="12192000" y="0"/>
+                </a:lnTo>
+                <a:lnTo>
+                  <a:pt x="12192000" y="3049325"/>
+                </a:lnTo>
+                <a:lnTo>
+                  <a:pt x="0" y="3049325"/>
+                </a:lnTo>
+                <a:close/>
+              </a:path>
+            </a:pathLst>
+          </a:custGeom>
+        </p:spPr>
+      </p:pic>
+      <p:sp>
+        <p:nvSpPr>
+          <p:cNvPr id="19" name="Rectangle 18">
+            <a:extLst>
+              <a:ext uri="{FF2B5EF4-FFF2-40B4-BE49-F238E27FC236}">
+                <a16:creationId xmlns:a16="http://schemas.microsoft.com/office/drawing/2014/main" id="{92CA431A-BC84-45C3-8430-0459E54A220F}"/>
+              </a:ext>
+              <a:ext uri="{C183D7F6-B498-43B3-948B-1728B52AA6E4}">
+                <adec:decorative xmlns:adec="http://schemas.microsoft.com/office/drawing/2017/decorative" val="1"/>
+              </a:ext>
+            </a:extLst>
+          </p:cNvPr>
+          <p:cNvSpPr>
+            <a:spLocks noGrp="1" noRot="1" noChangeAspect="1" noMove="1" noResize="1" noEditPoints="1" noAdjustHandles="1" noChangeArrowheads="1" noChangeShapeType="1" noTextEdit="1"/>
+          </p:cNvSpPr>
+          <p:nvPr>
+            <p:extLst>
+              <p:ext uri="{386F3935-93C4-4BCD-93E2-E3B085C9AB24}">
+                <p16:designElem xmlns:p16="http://schemas.microsoft.com/office/powerpoint/2015/main" val="1"/>
+              </p:ext>
+            </p:extLst>
+          </p:nvPr>
+        </p:nvSpPr>
+        <p:spPr>
+          <a:xfrm>
+            <a:off x="0" y="0"/>
+            <a:ext cx="12188952" cy="3238500"/>
+          </a:xfrm>
+          <a:prstGeom prst="rect">
+            <a:avLst/>
+          </a:prstGeom>
+          <a:solidFill>
+            <a:srgbClr val="FFFFFF"/>
+          </a:solidFill>
+          <a:ln>
+            <a:noFill/>
+          </a:ln>
+        </p:spPr>
+        <p:style>
+          <a:lnRef idx="2">
+            <a:schemeClr val="accent1">
+              <a:shade val="50000"/>
+            </a:schemeClr>
+          </a:lnRef>
+          <a:fillRef idx="1">
+            <a:schemeClr val="accent1"/>
+          </a:fillRef>
+          <a:effectRef idx="0">
+            <a:schemeClr val="accent1"/>
+          </a:effectRef>
+          <a:fontRef idx="minor">
+            <a:schemeClr val="lt1"/>
+          </a:fontRef>
+        </p:style>
+        <p:txBody>
+          <a:bodyPr rtlCol="0" anchor="ctr"/>
+          <a:lstStyle/>
+          <a:p>
+            <a:pPr algn="ctr"/>
+            <a:endParaRPr lang="en-US"/>
+          </a:p>
+        </p:txBody>
+      </p:sp>
+      <p:sp>
+        <p:nvSpPr>
+          <p:cNvPr id="2" name="Title 1">
+            <a:extLst>
+              <a:ext uri="{FF2B5EF4-FFF2-40B4-BE49-F238E27FC236}">
+                <a16:creationId xmlns:a16="http://schemas.microsoft.com/office/drawing/2014/main" id="{EDBD917A-4D57-447F-8824-5166AB22B210}"/>
+              </a:ext>
+            </a:extLst>
+          </p:cNvPr>
+          <p:cNvSpPr>
+            <a:spLocks noGrp="1"/>
+          </p:cNvSpPr>
+          <p:nvPr>
+            <p:ph type="ctrTitle"/>
+          </p:nvPr>
+        </p:nvSpPr>
+        <p:spPr>
+          <a:xfrm>
+            <a:off x="804484" y="940391"/>
+            <a:ext cx="10021446" cy="2944457"/>
+          </a:xfrm>
+        </p:spPr>
+        <p:txBody>
+          <a:bodyPr anchor="ctr">
+            <a:normAutofit/>
+          </a:bodyPr>
+          <a:lstStyle/>
+          <a:p>
+            <a:pPr algn="l"/>
+            <a:r>
+              <a:rPr lang="en-US" sz="6600" dirty="0">
+                <a:solidFill>
+                  <a:srgbClr val="000000"/>
+                </a:solidFill>
+              </a:rPr>
+              <a:t>Why is it important?</a:t>
+            </a:r>
+          </a:p>
+        </p:txBody>
+      </p:sp>
+    </p:spTree>
+    <p:extLst>
+      <p:ext uri="{BB962C8B-B14F-4D97-AF65-F5344CB8AC3E}">
+        <p14:creationId xmlns:p14="http://schemas.microsoft.com/office/powerpoint/2010/main" val="1424455108"/>
+      </p:ext>
+    </p:extLst>
+  </p:cSld>
+  <p:clrMapOvr>
+    <a:masterClrMapping/>
+  </p:clrMapOvr>
+</p:sld>
+</file>
+
+<file path=ppt/slides/slide5.xml><?xml version="1.0" encoding="utf-8"?>
+<p:sld xmlns:a="http://schemas.openxmlformats.org/drawingml/2006/main" xmlns:r="http://schemas.openxmlformats.org/officeDocument/2006/relationships" xmlns:p="http://schemas.openxmlformats.org/presentationml/2006/main">
+  <p:cSld>
+    <p:bg>
+      <p:bgPr>
+        <a:solidFill>
+          <a:schemeClr val="bg1"/>
+        </a:solidFill>
+        <a:effectLst/>
+      </p:bgPr>
+    </p:bg>
+    <p:spTree>
+      <p:nvGrpSpPr>
+        <p:cNvPr id="1" name=""/>
+        <p:cNvGrpSpPr/>
+        <p:nvPr/>
+      </p:nvGrpSpPr>
+      <p:grpSpPr>
+        <a:xfrm>
+          <a:off x="0" y="0"/>
+          <a:ext cx="0" cy="0"/>
+          <a:chOff x="0" y="0"/>
+          <a:chExt cx="0" cy="0"/>
+        </a:xfrm>
+      </p:grpSpPr>
+      <p:sp>
+        <p:nvSpPr>
+          <p:cNvPr id="15" name="Rectangle 14">
+            <a:extLst>
+              <a:ext uri="{FF2B5EF4-FFF2-40B4-BE49-F238E27FC236}">
+                <a16:creationId xmlns:a16="http://schemas.microsoft.com/office/drawing/2014/main" id="{86197D16-FE75-4A0E-A0C9-28C0F04A43DF}"/>
+              </a:ext>
+              <a:ext uri="{C183D7F6-B498-43B3-948B-1728B52AA6E4}">
+                <adec:decorative xmlns:adec="http://schemas.microsoft.com/office/drawing/2017/decorative" val="1"/>
+              </a:ext>
+            </a:extLst>
+          </p:cNvPr>
+          <p:cNvSpPr>
+            <a:spLocks noGrp="1" noRot="1" noChangeAspect="1" noMove="1" noResize="1" noEditPoints="1" noAdjustHandles="1" noChangeArrowheads="1" noChangeShapeType="1" noTextEdit="1"/>
+          </p:cNvSpPr>
+          <p:nvPr>
+            <p:extLst>
+              <p:ext uri="{386F3935-93C4-4BCD-93E2-E3B085C9AB24}">
+                <p16:designElem xmlns:p16="http://schemas.microsoft.com/office/powerpoint/2015/main" val="1"/>
+              </p:ext>
+            </p:extLst>
+          </p:nvPr>
+        </p:nvSpPr>
+        <p:spPr>
+          <a:xfrm>
+            <a:off x="0" y="609599"/>
+            <a:ext cx="12192000" cy="6248400"/>
+          </a:xfrm>
+          <a:prstGeom prst="rect">
+            <a:avLst/>
+          </a:prstGeom>
+          <a:gradFill>
+            <a:gsLst>
+              <a:gs pos="0">
+                <a:schemeClr val="accent1">
+                  <a:lumMod val="90000"/>
+                </a:schemeClr>
+              </a:gs>
+              <a:gs pos="25000">
+                <a:schemeClr val="accent1">
+                  <a:lumMod val="90000"/>
+                </a:schemeClr>
+              </a:gs>
+              <a:gs pos="94000">
+                <a:schemeClr val="bg2">
+                  <a:lumMod val="25000"/>
+                </a:schemeClr>
+              </a:gs>
+              <a:gs pos="100000">
+                <a:schemeClr val="bg2">
+                  <a:lumMod val="25000"/>
+                </a:schemeClr>
+              </a:gs>
+            </a:gsLst>
+            <a:lin ang="4200000" scaled="0"/>
+          </a:gradFill>
+          <a:ln>
+            <a:noFill/>
+          </a:ln>
+        </p:spPr>
+        <p:style>
+          <a:lnRef idx="2">
+            <a:schemeClr val="accent1">
+              <a:shade val="50000"/>
+            </a:schemeClr>
+          </a:lnRef>
+          <a:fillRef idx="1">
+            <a:schemeClr val="accent1"/>
+          </a:fillRef>
+          <a:effectRef idx="0">
+            <a:schemeClr val="accent1"/>
+          </a:effectRef>
+          <a:fontRef idx="minor">
+            <a:schemeClr val="lt1"/>
+          </a:fontRef>
+        </p:style>
+        <p:txBody>
+          <a:bodyPr rtlCol="0" anchor="ctr"/>
+          <a:lstStyle/>
+          <a:p>
+            <a:pPr algn="ctr"/>
+            <a:endParaRPr lang="en-US"/>
+          </a:p>
+        </p:txBody>
+      </p:sp>
+      <p:pic>
+        <p:nvPicPr>
+          <p:cNvPr id="17" name="Picture 16">
+            <a:extLst>
+              <a:ext uri="{FF2B5EF4-FFF2-40B4-BE49-F238E27FC236}">
+                <a16:creationId xmlns:a16="http://schemas.microsoft.com/office/drawing/2014/main" id="{FA8FCEC6-4B30-4FF2-8B32-504BEAEA3A16}"/>
+              </a:ext>
+              <a:ext uri="{C183D7F6-B498-43B3-948B-1728B52AA6E4}">
+                <adec:decorative xmlns:adec="http://schemas.microsoft.com/office/drawing/2017/decorative" val="1"/>
+              </a:ext>
+            </a:extLst>
+          </p:cNvPr>
+          <p:cNvPicPr>
+            <a:picLocks noGrp="1" noRot="1" noChangeAspect="1" noMove="1" noResize="1" noEditPoints="1" noAdjustHandles="1" noChangeArrowheads="1" noChangeShapeType="1" noCrop="1"/>
+          </p:cNvPicPr>
+          <p:nvPr>
+            <p:extLst>
+              <p:ext uri="{386F3935-93C4-4BCD-93E2-E3B085C9AB24}">
+                <p16:designElem xmlns:p16="http://schemas.microsoft.com/office/powerpoint/2015/main" val="1"/>
+              </p:ext>
+            </p:extLst>
+          </p:nvPr>
+        </p:nvPicPr>
+        <p:blipFill>
+          <a:blip r:embed="rId2">
+            <a:extLst>
+              <a:ext uri="{28A0092B-C50C-407E-A947-70E740481C1C}">
+                <a14:useLocalDpi xmlns:a14="http://schemas.microsoft.com/office/drawing/2010/main" val="0"/>
+              </a:ext>
+            </a:extLst>
+          </a:blip>
+          <a:srcRect t="45716" b="9820"/>
+          <a:stretch>
+            <a:fillRect/>
+          </a:stretch>
+        </p:blipFill>
+        <p:spPr>
+          <a:xfrm flipV="1">
+            <a:off x="0" y="2374533"/>
+            <a:ext cx="12192000" cy="3049325"/>
+          </a:xfrm>
+          <a:custGeom>
+            <a:avLst/>
+            <a:gdLst>
+              <a:gd name="connsiteX0" fmla="*/ 0 w 12192000"/>
+              <a:gd name="connsiteY0" fmla="*/ 0 h 3049325"/>
+              <a:gd name="connsiteX1" fmla="*/ 12192000 w 12192000"/>
+              <a:gd name="connsiteY1" fmla="*/ 0 h 3049325"/>
+              <a:gd name="connsiteX2" fmla="*/ 12192000 w 12192000"/>
+              <a:gd name="connsiteY2" fmla="*/ 3049325 h 3049325"/>
+              <a:gd name="connsiteX3" fmla="*/ 0 w 12192000"/>
+              <a:gd name="connsiteY3" fmla="*/ 3049325 h 3049325"/>
+            </a:gdLst>
+            <a:ahLst/>
+            <a:cxnLst>
+              <a:cxn ang="0">
+                <a:pos x="connsiteX0" y="connsiteY0"/>
+              </a:cxn>
+              <a:cxn ang="0">
+                <a:pos x="connsiteX1" y="connsiteY1"/>
+              </a:cxn>
+              <a:cxn ang="0">
+                <a:pos x="connsiteX2" y="connsiteY2"/>
+              </a:cxn>
+              <a:cxn ang="0">
+                <a:pos x="connsiteX3" y="connsiteY3"/>
+              </a:cxn>
+            </a:cxnLst>
+            <a:rect l="l" t="t" r="r" b="b"/>
+            <a:pathLst>
+              <a:path w="12192000" h="3049325">
+                <a:moveTo>
+                  <a:pt x="0" y="0"/>
+                </a:moveTo>
+                <a:lnTo>
+                  <a:pt x="12192000" y="0"/>
+                </a:lnTo>
+                <a:lnTo>
+                  <a:pt x="12192000" y="3049325"/>
+                </a:lnTo>
+                <a:lnTo>
+                  <a:pt x="0" y="3049325"/>
+                </a:lnTo>
+                <a:close/>
+              </a:path>
+            </a:pathLst>
+          </a:custGeom>
+        </p:spPr>
+      </p:pic>
+      <p:sp>
+        <p:nvSpPr>
+          <p:cNvPr id="19" name="Rectangle 18">
+            <a:extLst>
+              <a:ext uri="{FF2B5EF4-FFF2-40B4-BE49-F238E27FC236}">
+                <a16:creationId xmlns:a16="http://schemas.microsoft.com/office/drawing/2014/main" id="{92CA431A-BC84-45C3-8430-0459E54A220F}"/>
+              </a:ext>
+              <a:ext uri="{C183D7F6-B498-43B3-948B-1728B52AA6E4}">
+                <adec:decorative xmlns:adec="http://schemas.microsoft.com/office/drawing/2017/decorative" val="1"/>
+              </a:ext>
+            </a:extLst>
+          </p:cNvPr>
+          <p:cNvSpPr>
+            <a:spLocks noGrp="1" noRot="1" noChangeAspect="1" noMove="1" noResize="1" noEditPoints="1" noAdjustHandles="1" noChangeArrowheads="1" noChangeShapeType="1" noTextEdit="1"/>
+          </p:cNvSpPr>
+          <p:nvPr>
+            <p:extLst>
+              <p:ext uri="{386F3935-93C4-4BCD-93E2-E3B085C9AB24}">
+                <p16:designElem xmlns:p16="http://schemas.microsoft.com/office/powerpoint/2015/main" val="1"/>
+              </p:ext>
+            </p:extLst>
+          </p:nvPr>
+        </p:nvSpPr>
+        <p:spPr>
+          <a:xfrm>
+            <a:off x="0" y="0"/>
+            <a:ext cx="12188952" cy="3238500"/>
+          </a:xfrm>
+          <a:prstGeom prst="rect">
+            <a:avLst/>
+          </a:prstGeom>
+          <a:solidFill>
+            <a:srgbClr val="FFFFFF"/>
+          </a:solidFill>
+          <a:ln>
+            <a:noFill/>
+          </a:ln>
+        </p:spPr>
+        <p:style>
+          <a:lnRef idx="2">
+            <a:schemeClr val="accent1">
+              <a:shade val="50000"/>
+            </a:schemeClr>
+          </a:lnRef>
+          <a:fillRef idx="1">
+            <a:schemeClr val="accent1"/>
+          </a:fillRef>
+          <a:effectRef idx="0">
+            <a:schemeClr val="accent1"/>
+          </a:effectRef>
+          <a:fontRef idx="minor">
+            <a:schemeClr val="lt1"/>
+          </a:fontRef>
+        </p:style>
+        <p:txBody>
+          <a:bodyPr rtlCol="0" anchor="ctr"/>
+          <a:lstStyle/>
+          <a:p>
+            <a:pPr algn="ctr"/>
+            <a:endParaRPr lang="en-US"/>
+          </a:p>
+        </p:txBody>
+      </p:sp>
+      <p:sp>
+        <p:nvSpPr>
+          <p:cNvPr id="2" name="Title 1">
+            <a:extLst>
+              <a:ext uri="{FF2B5EF4-FFF2-40B4-BE49-F238E27FC236}">
+                <a16:creationId xmlns:a16="http://schemas.microsoft.com/office/drawing/2014/main" id="{EDBD917A-4D57-447F-8824-5166AB22B210}"/>
+              </a:ext>
+            </a:extLst>
+          </p:cNvPr>
+          <p:cNvSpPr>
+            <a:spLocks noGrp="1"/>
+          </p:cNvSpPr>
+          <p:nvPr>
+            <p:ph type="ctrTitle"/>
+          </p:nvPr>
+        </p:nvSpPr>
+        <p:spPr>
+          <a:xfrm>
             <a:off x="804484" y="940391"/>
             <a:ext cx="10021446" cy="2944457"/>
           </a:xfrm>
@@ -6822,10 +8706,10 @@
           <a:p>
             <a:pPr algn="ctr"/>
             <a:r>
-              <a:rPr lang="pl-PL" sz="2800" dirty="0"/>
+              <a:rPr lang="pl-PL" sz="2800" b="1" dirty="0"/>
               <a:t>Fundamental Skills</a:t>
             </a:r>
-            <a:endParaRPr lang="en-US" sz="2800" dirty="0"/>
+            <a:endParaRPr lang="en-US" sz="2800" b="1" dirty="0"/>
           </a:p>
         </p:txBody>
       </p:sp>
@@ -7009,10 +8893,10 @@
           <a:p>
             <a:pPr algn="ctr"/>
             <a:r>
-              <a:rPr lang="pl-PL" sz="2800" dirty="0"/>
+              <a:rPr lang="pl-PL" sz="2800" b="1" dirty="0"/>
               <a:t>Personal Skills</a:t>
             </a:r>
-            <a:endParaRPr lang="en-US" sz="2800" dirty="0"/>
+            <a:endParaRPr lang="en-US" sz="2800" b="1" dirty="0"/>
           </a:p>
         </p:txBody>
       </p:sp>
@@ -7271,10 +9155,10 @@
           <a:p>
             <a:pPr algn="ctr"/>
             <a:r>
-              <a:rPr lang="pl-PL" sz="2800" dirty="0"/>
+              <a:rPr lang="pl-PL" sz="2800" b="1" dirty="0"/>
               <a:t>Soft Skills</a:t>
             </a:r>
-            <a:endParaRPr lang="en-US" sz="2800" dirty="0"/>
+            <a:endParaRPr lang="en-US" sz="2800" b="1" dirty="0"/>
           </a:p>
         </p:txBody>
       </p:sp>
@@ -7608,18 +9492,22 @@
           <a:p>
             <a:pPr algn="ctr"/>
             <a:r>
-              <a:rPr lang="pl-PL" sz="2800" dirty="0"/>
-              <a:t>Core Proffesional</a:t>
-            </a:r>
-            <a:r>
-              <a:rPr lang="en-US" sz="2800" dirty="0"/>
+              <a:rPr lang="pl-PL" sz="2800" b="1" dirty="0"/>
+              <a:t>Core Prof</a:t>
+            </a:r>
+            <a:r>
+              <a:rPr lang="ru-RU" sz="2800" b="1" dirty="0"/>
+              <a:t>.</a:t>
+            </a:r>
+            <a:r>
+              <a:rPr lang="en-US" sz="2800" b="1" dirty="0"/>
               <a:t> </a:t>
             </a:r>
             <a:r>
-              <a:rPr lang="pl-PL" sz="2800" dirty="0"/>
+              <a:rPr lang="pl-PL" sz="2800" b="1" dirty="0"/>
               <a:t>Skills</a:t>
             </a:r>
-            <a:endParaRPr lang="en-US" sz="2800" dirty="0"/>
+            <a:endParaRPr lang="en-US" sz="2800" b="1" dirty="0"/>
           </a:p>
         </p:txBody>
       </p:sp>

</xml_diff>